<commit_message>
Added classes to lab5 presentation updated code a little
</commit_message>
<xml_diff>
--- a/Presentations/RoboticorpLab5.pptx
+++ b/Presentations/RoboticorpLab5.pptx
@@ -4890,7 +4890,61 @@
           <a:bodyPr/>
           <a:lstStyle/>
           <a:p>
-            <a:endParaRPr lang="en-US"/>
+            <a:r>
+              <a:rPr lang="en-US" dirty="0" smtClean="0"/>
+              <a:t>Three Classes</a:t>
+            </a:r>
+          </a:p>
+          <a:p>
+            <a:pPr lvl="1"/>
+            <a:r>
+              <a:rPr lang="en-US" dirty="0" smtClean="0"/>
+              <a:t>Activator – Main program, deals with connection and timer</a:t>
+            </a:r>
+          </a:p>
+          <a:p>
+            <a:pPr lvl="1"/>
+            <a:r>
+              <a:rPr lang="en-US" dirty="0" smtClean="0"/>
+              <a:t>Driver – controls Robot movement and access to hardware</a:t>
+            </a:r>
+          </a:p>
+          <a:p>
+            <a:pPr lvl="1"/>
+            <a:r>
+              <a:rPr lang="en-US" dirty="0" err="1" smtClean="0"/>
+              <a:t>MessageHandler</a:t>
+            </a:r>
+            <a:r>
+              <a:rPr lang="en-US" dirty="0" smtClean="0"/>
+              <a:t> – deals with decoding and creating messages</a:t>
+            </a:r>
+            <a:endParaRPr lang="en-US" dirty="0"/>
+          </a:p>
+          <a:p>
+            <a:r>
+              <a:rPr lang="en-US" dirty="0" smtClean="0"/>
+              <a:t>Information Hidden</a:t>
+            </a:r>
+          </a:p>
+          <a:p>
+            <a:pPr lvl="1"/>
+            <a:r>
+              <a:rPr lang="en-US" dirty="0" smtClean="0"/>
+              <a:t>How the robot is being controlled</a:t>
+            </a:r>
+          </a:p>
+          <a:p>
+            <a:pPr lvl="1"/>
+            <a:r>
+              <a:rPr lang="en-US" dirty="0" smtClean="0"/>
+              <a:t>How messages are created and decoded, and what they mean in terms of </a:t>
+            </a:r>
+            <a:r>
+              <a:rPr lang="en-US" smtClean="0"/>
+              <a:t>robot movement</a:t>
+            </a:r>
+            <a:endParaRPr lang="en-US" dirty="0" smtClean="0"/>
           </a:p>
         </p:txBody>
       </p:sp>

</xml_diff>

<commit_message>
Anticipated Changes and Management Stuff added to Presentation 5
</commit_message>
<xml_diff>
--- a/Presentations/RoboticorpLab5.pptx
+++ b/Presentations/RoboticorpLab5.pptx
@@ -1,6 +1,6 @@
 
 <file path=ppt/presentation.xml><?xml version="1.0" encoding="utf-8"?>
-<p:presentation xmlns:a="http://schemas.openxmlformats.org/drawingml/2006/main" xmlns:r="http://schemas.openxmlformats.org/officeDocument/2006/relationships" xmlns:p="http://schemas.openxmlformats.org/presentationml/2006/main" saveSubsetFonts="1">
+<p:presentation xmlns:a="http://schemas.openxmlformats.org/drawingml/2006/main" xmlns:r="http://schemas.openxmlformats.org/officeDocument/2006/relationships" xmlns:mc="http://schemas.openxmlformats.org/markup-compatibility/2006" xmlns:mv="urn:schemas-microsoft-com:mac:vml" xmlns:p="http://schemas.openxmlformats.org/presentationml/2006/main" mc:Ignorable="mv" mc:PreserveAttributes="mv:*" saveSubsetFonts="1">
   <p:sldMasterIdLst>
     <p:sldMasterId id="2147483660" r:id="rId1"/>
   </p:sldMasterIdLst>
@@ -113,7 +113,7 @@
 </file>
 
 <file path=ppt/slideLayouts/slideLayout1.xml><?xml version="1.0" encoding="utf-8"?>
-<p:sldLayout xmlns:a="http://schemas.openxmlformats.org/drawingml/2006/main" xmlns:r="http://schemas.openxmlformats.org/officeDocument/2006/relationships" xmlns:p="http://schemas.openxmlformats.org/presentationml/2006/main" showMasterSp="0" type="title" preserve="1">
+<p:sldLayout xmlns:a="http://schemas.openxmlformats.org/drawingml/2006/main" xmlns:r="http://schemas.openxmlformats.org/officeDocument/2006/relationships" xmlns:mc="http://schemas.openxmlformats.org/markup-compatibility/2006" xmlns:mv="urn:schemas-microsoft-com:mac:vml" xmlns:p="http://schemas.openxmlformats.org/presentationml/2006/main" mc:Ignorable="mv" mc:PreserveAttributes="mv:*" showMasterSp="0" type="title" preserve="1">
   <p:cSld name="Title Slide">
     <p:spTree>
       <p:nvGrpSpPr>
@@ -192,9 +192,7 @@
         </p:style>
         <p:txBody>
           <a:bodyPr anchor="ctr"/>
-          <a:lstStyle>
-            <a:extLst/>
-          </a:lstStyle>
+          <a:lstStyle/>
           <a:p>
             <a:pPr algn="ctr" eaLnBrk="1" latinLnBrk="0" hangingPunct="1"/>
             <a:endParaRPr kumimoji="0" lang="en-US"/>
@@ -243,7 +241,6 @@
                 </a:effectLst>
               </a:defRPr>
             </a:lvl1pPr>
-            <a:extLst/>
           </a:lstStyle>
           <a:p>
             <a:r>
@@ -305,7 +302,6 @@
             <a:lvl9pPr marL="3657600" indent="0" algn="ctr">
               <a:buNone/>
             </a:lvl9pPr>
-            <a:extLst/>
           </a:lstStyle>
           <a:p>
             <a:r>
@@ -407,9 +403,7 @@
           </p:spPr>
           <p:txBody>
             <a:bodyPr vert="horz" wrap="square" lIns="91440" tIns="45720" rIns="91440" bIns="45720" anchor="t" compatLnSpc="1"/>
-            <a:lstStyle>
-              <a:extLst/>
-            </a:lstStyle>
+            <a:lstStyle/>
             <a:p>
               <a:endParaRPr kumimoji="0" lang="en-US"/>
             </a:p>
@@ -489,9 +483,7 @@
           </p:spPr>
           <p:txBody>
             <a:bodyPr vert="horz" wrap="square" lIns="91440" tIns="45720" rIns="91440" bIns="45720" anchor="t" compatLnSpc="1"/>
-            <a:lstStyle>
-              <a:extLst/>
-            </a:lstStyle>
+            <a:lstStyle/>
             <a:p>
               <a:endParaRPr kumimoji="0" lang="en-US"/>
             </a:p>
@@ -648,9 +640,7 @@
           </p:style>
           <p:txBody>
             <a:bodyPr vert="horz" wrap="square" lIns="91440" tIns="45720" rIns="91440" bIns="45720" anchor="ctr" compatLnSpc="1"/>
-            <a:lstStyle>
-              <a:extLst/>
-            </a:lstStyle>
+            <a:lstStyle/>
             <a:p>
               <a:pPr algn="ctr" eaLnBrk="1" latinLnBrk="0" hangingPunct="1"/>
               <a:endParaRPr kumimoji="0" lang="en-US"/>
@@ -732,12 +722,12 @@
                 </a:solidFill>
               </a:defRPr>
             </a:lvl1pPr>
-            <a:extLst/>
           </a:lstStyle>
           <a:p>
             <a:fld id="{578D3EDA-CDD4-4B8C-8889-A1E60E6090FC}" type="datetimeFigureOut">
               <a:rPr lang="en-US" smtClean="0"/>
-              <a:t>3/17/13</a:t>
+              <a:pPr/>
+              <a:t>3/18/13</a:t>
             </a:fld>
             <a:endParaRPr lang="en-US"/>
           </a:p>
@@ -766,7 +756,6 @@
                 </a:solidFill>
               </a:defRPr>
             </a:lvl1pPr>
-            <a:extLst/>
           </a:lstStyle>
           <a:p>
             <a:endParaRPr lang="en-US"/>
@@ -794,11 +783,11 @@
                 </a:solidFill>
               </a:defRPr>
             </a:lvl1pPr>
-            <a:extLst/>
           </a:lstStyle>
           <a:p>
             <a:fld id="{C766FA25-E0A3-4D46-9455-78B8C0E697F6}" type="slidenum">
               <a:rPr lang="en-US" smtClean="0"/>
+              <a:pPr/>
               <a:t>‹#›</a:t>
             </a:fld>
             <a:endParaRPr lang="en-US"/>
@@ -814,7 +803,7 @@
 </file>
 
 <file path=ppt/slideLayouts/slideLayout10.xml><?xml version="1.0" encoding="utf-8"?>
-<p:sldLayout xmlns:a="http://schemas.openxmlformats.org/drawingml/2006/main" xmlns:r="http://schemas.openxmlformats.org/officeDocument/2006/relationships" xmlns:p="http://schemas.openxmlformats.org/presentationml/2006/main" type="vertTx" preserve="1">
+<p:sldLayout xmlns:a="http://schemas.openxmlformats.org/drawingml/2006/main" xmlns:r="http://schemas.openxmlformats.org/officeDocument/2006/relationships" xmlns:mc="http://schemas.openxmlformats.org/markup-compatibility/2006" xmlns:mv="urn:schemas-microsoft-com:mac:vml" xmlns:p="http://schemas.openxmlformats.org/presentationml/2006/main" mc:Ignorable="mv" mc:PreserveAttributes="mv:*" type="vertTx" preserve="1">
   <p:cSld name="Title and Vertical Text">
     <p:spTree>
       <p:nvGrpSpPr>
@@ -843,9 +832,7 @@
         <p:spPr/>
         <p:txBody>
           <a:bodyPr/>
-          <a:lstStyle>
-            <a:extLst/>
-          </a:lstStyle>
+          <a:lstStyle/>
           <a:p>
             <a:r>
               <a:rPr kumimoji="0" lang="en-US" smtClean="0"/>
@@ -873,9 +860,7 @@
         </p:spPr>
         <p:txBody>
           <a:bodyPr vert="eaVert"/>
-          <a:lstStyle>
-            <a:extLst/>
-          </a:lstStyle>
+          <a:lstStyle/>
           <a:p>
             <a:pPr lvl="0" eaLnBrk="1" latinLnBrk="0" hangingPunct="1"/>
             <a:r>
@@ -927,13 +912,12 @@
         <p:spPr/>
         <p:txBody>
           <a:bodyPr/>
-          <a:lstStyle>
-            <a:extLst/>
-          </a:lstStyle>
+          <a:lstStyle/>
           <a:p>
             <a:fld id="{578D3EDA-CDD4-4B8C-8889-A1E60E6090FC}" type="datetimeFigureOut">
               <a:rPr lang="en-US" smtClean="0"/>
-              <a:t>3/17/13</a:t>
+              <a:pPr/>
+              <a:t>3/18/13</a:t>
             </a:fld>
             <a:endParaRPr lang="en-US"/>
           </a:p>
@@ -952,9 +936,7 @@
         <p:spPr/>
         <p:txBody>
           <a:bodyPr/>
-          <a:lstStyle>
-            <a:extLst/>
-          </a:lstStyle>
+          <a:lstStyle/>
           <a:p>
             <a:endParaRPr lang="en-US"/>
           </a:p>
@@ -973,12 +955,11 @@
         <p:spPr/>
         <p:txBody>
           <a:bodyPr/>
-          <a:lstStyle>
-            <a:extLst/>
-          </a:lstStyle>
+          <a:lstStyle/>
           <a:p>
             <a:fld id="{C766FA25-E0A3-4D46-9455-78B8C0E697F6}" type="slidenum">
               <a:rPr lang="en-US" smtClean="0"/>
+              <a:pPr/>
               <a:t>‹#›</a:t>
             </a:fld>
             <a:endParaRPr lang="en-US"/>
@@ -994,7 +975,7 @@
 </file>
 
 <file path=ppt/slideLayouts/slideLayout11.xml><?xml version="1.0" encoding="utf-8"?>
-<p:sldLayout xmlns:a="http://schemas.openxmlformats.org/drawingml/2006/main" xmlns:r="http://schemas.openxmlformats.org/officeDocument/2006/relationships" xmlns:p="http://schemas.openxmlformats.org/presentationml/2006/main" type="vertTitleAndTx" preserve="1">
+<p:sldLayout xmlns:a="http://schemas.openxmlformats.org/drawingml/2006/main" xmlns:r="http://schemas.openxmlformats.org/officeDocument/2006/relationships" xmlns:mc="http://schemas.openxmlformats.org/markup-compatibility/2006" xmlns:mv="urn:schemas-microsoft-com:mac:vml" xmlns:p="http://schemas.openxmlformats.org/presentationml/2006/main" mc:Ignorable="mv" mc:PreserveAttributes="mv:*" type="vertTitleAndTx" preserve="1">
   <p:cSld name="Vertical Title and Text">
     <p:spTree>
       <p:nvGrpSpPr>
@@ -1028,9 +1009,7 @@
         </p:spPr>
         <p:txBody>
           <a:bodyPr vert="eaVert"/>
-          <a:lstStyle>
-            <a:extLst/>
-          </a:lstStyle>
+          <a:lstStyle/>
           <a:p>
             <a:r>
               <a:rPr kumimoji="0" lang="en-US" smtClean="0"/>
@@ -1058,9 +1037,7 @@
         </p:spPr>
         <p:txBody>
           <a:bodyPr vert="eaVert"/>
-          <a:lstStyle>
-            <a:extLst/>
-          </a:lstStyle>
+          <a:lstStyle/>
           <a:p>
             <a:pPr lvl="0" eaLnBrk="1" latinLnBrk="0" hangingPunct="1"/>
             <a:r>
@@ -1112,13 +1089,12 @@
         <p:spPr/>
         <p:txBody>
           <a:bodyPr/>
-          <a:lstStyle>
-            <a:extLst/>
-          </a:lstStyle>
+          <a:lstStyle/>
           <a:p>
             <a:fld id="{578D3EDA-CDD4-4B8C-8889-A1E60E6090FC}" type="datetimeFigureOut">
               <a:rPr lang="en-US" smtClean="0"/>
-              <a:t>3/17/13</a:t>
+              <a:pPr/>
+              <a:t>3/18/13</a:t>
             </a:fld>
             <a:endParaRPr lang="en-US"/>
           </a:p>
@@ -1137,9 +1113,7 @@
         <p:spPr/>
         <p:txBody>
           <a:bodyPr/>
-          <a:lstStyle>
-            <a:extLst/>
-          </a:lstStyle>
+          <a:lstStyle/>
           <a:p>
             <a:endParaRPr lang="en-US"/>
           </a:p>
@@ -1158,12 +1132,11 @@
         <p:spPr/>
         <p:txBody>
           <a:bodyPr/>
-          <a:lstStyle>
-            <a:extLst/>
-          </a:lstStyle>
+          <a:lstStyle/>
           <a:p>
             <a:fld id="{C766FA25-E0A3-4D46-9455-78B8C0E697F6}" type="slidenum">
               <a:rPr lang="en-US" smtClean="0"/>
+              <a:pPr/>
               <a:t>‹#›</a:t>
             </a:fld>
             <a:endParaRPr lang="en-US"/>
@@ -1179,7 +1152,7 @@
 </file>
 
 <file path=ppt/slideLayouts/slideLayout2.xml><?xml version="1.0" encoding="utf-8"?>
-<p:sldLayout xmlns:a="http://schemas.openxmlformats.org/drawingml/2006/main" xmlns:r="http://schemas.openxmlformats.org/officeDocument/2006/relationships" xmlns:p="http://schemas.openxmlformats.org/presentationml/2006/main" type="obj" preserve="1">
+<p:sldLayout xmlns:a="http://schemas.openxmlformats.org/drawingml/2006/main" xmlns:r="http://schemas.openxmlformats.org/officeDocument/2006/relationships" xmlns:mc="http://schemas.openxmlformats.org/markup-compatibility/2006" xmlns:mv="urn:schemas-microsoft-com:mac:vml" xmlns:p="http://schemas.openxmlformats.org/presentationml/2006/main" mc:Ignorable="mv" mc:PreserveAttributes="mv:*" type="obj" preserve="1">
   <p:cSld name="Title and Content">
     <p:spTree>
       <p:nvGrpSpPr>
@@ -1208,9 +1181,7 @@
         <p:spPr/>
         <p:txBody>
           <a:bodyPr/>
-          <a:lstStyle>
-            <a:extLst/>
-          </a:lstStyle>
+          <a:lstStyle/>
           <a:p>
             <a:pPr lvl="0" eaLnBrk="1" latinLnBrk="0" hangingPunct="1"/>
             <a:r>
@@ -1262,13 +1233,12 @@
         <p:spPr/>
         <p:txBody>
           <a:bodyPr/>
-          <a:lstStyle>
-            <a:extLst/>
-          </a:lstStyle>
+          <a:lstStyle/>
           <a:p>
             <a:fld id="{578D3EDA-CDD4-4B8C-8889-A1E60E6090FC}" type="datetimeFigureOut">
               <a:rPr lang="en-US" smtClean="0"/>
-              <a:t>3/17/13</a:t>
+              <a:pPr/>
+              <a:t>3/18/13</a:t>
             </a:fld>
             <a:endParaRPr lang="en-US"/>
           </a:p>
@@ -1287,9 +1257,7 @@
         <p:spPr/>
         <p:txBody>
           <a:bodyPr/>
-          <a:lstStyle>
-            <a:extLst/>
-          </a:lstStyle>
+          <a:lstStyle/>
           <a:p>
             <a:endParaRPr lang="en-US"/>
           </a:p>
@@ -1308,12 +1276,11 @@
         <p:spPr/>
         <p:txBody>
           <a:bodyPr/>
-          <a:lstStyle>
-            <a:extLst/>
-          </a:lstStyle>
+          <a:lstStyle/>
           <a:p>
             <a:fld id="{C766FA25-E0A3-4D46-9455-78B8C0E697F6}" type="slidenum">
               <a:rPr lang="en-US" smtClean="0"/>
+              <a:pPr/>
               <a:t>‹#›</a:t>
             </a:fld>
             <a:endParaRPr lang="en-US"/>
@@ -1333,9 +1300,7 @@
         <p:spPr/>
         <p:txBody>
           <a:bodyPr rtlCol="0"/>
-          <a:lstStyle>
-            <a:extLst/>
-          </a:lstStyle>
+          <a:lstStyle/>
           <a:p>
             <a:r>
               <a:rPr kumimoji="0" lang="en-US" smtClean="0"/>
@@ -1354,7 +1319,7 @@
 </file>
 
 <file path=ppt/slideLayouts/slideLayout3.xml><?xml version="1.0" encoding="utf-8"?>
-<p:sldLayout xmlns:a="http://schemas.openxmlformats.org/drawingml/2006/main" xmlns:r="http://schemas.openxmlformats.org/officeDocument/2006/relationships" xmlns:p="http://schemas.openxmlformats.org/presentationml/2006/main" type="secHead" preserve="1">
+<p:sldLayout xmlns:a="http://schemas.openxmlformats.org/drawingml/2006/main" xmlns:r="http://schemas.openxmlformats.org/officeDocument/2006/relationships" xmlns:mc="http://schemas.openxmlformats.org/markup-compatibility/2006" xmlns:mv="urn:schemas-microsoft-com:mac:vml" xmlns:p="http://schemas.openxmlformats.org/presentationml/2006/main" mc:Ignorable="mv" mc:PreserveAttributes="mv:*" type="secHead" preserve="1">
   <p:cSld name="Section Header">
     <p:bg>
       <p:bgRef idx="1002">
@@ -1415,7 +1380,6 @@
                 </a:effectLst>
               </a:defRPr>
             </a:lvl1pPr>
-            <a:extLst/>
           </a:lstStyle>
           <a:p>
             <a:r>
@@ -1493,7 +1457,6 @@
                 </a:solidFill>
               </a:defRPr>
             </a:lvl5pPr>
-            <a:extLst/>
           </a:lstStyle>
           <a:p>
             <a:pPr lvl="0" eaLnBrk="1" latinLnBrk="0" hangingPunct="1"/>
@@ -1517,13 +1480,12 @@
         <p:spPr/>
         <p:txBody>
           <a:bodyPr/>
-          <a:lstStyle>
-            <a:extLst/>
-          </a:lstStyle>
+          <a:lstStyle/>
           <a:p>
             <a:fld id="{578D3EDA-CDD4-4B8C-8889-A1E60E6090FC}" type="datetimeFigureOut">
               <a:rPr lang="en-US" smtClean="0"/>
-              <a:t>3/17/13</a:t>
+              <a:pPr/>
+              <a:t>3/18/13</a:t>
             </a:fld>
             <a:endParaRPr lang="en-US"/>
           </a:p>
@@ -1542,9 +1504,7 @@
         <p:spPr/>
         <p:txBody>
           <a:bodyPr/>
-          <a:lstStyle>
-            <a:extLst/>
-          </a:lstStyle>
+          <a:lstStyle/>
           <a:p>
             <a:endParaRPr lang="en-US"/>
           </a:p>
@@ -1563,12 +1523,11 @@
         <p:spPr/>
         <p:txBody>
           <a:bodyPr/>
-          <a:lstStyle>
-            <a:extLst/>
-          </a:lstStyle>
+          <a:lstStyle/>
           <a:p>
             <a:fld id="{C766FA25-E0A3-4D46-9455-78B8C0E697F6}" type="slidenum">
               <a:rPr lang="en-US" smtClean="0"/>
+              <a:pPr/>
               <a:t>‹#›</a:t>
             </a:fld>
             <a:endParaRPr lang="en-US"/>
@@ -1646,9 +1605,7 @@
         </p:style>
         <p:txBody>
           <a:bodyPr anchor="ctr"/>
-          <a:lstStyle>
-            <a:extLst/>
-          </a:lstStyle>
+          <a:lstStyle/>
           <a:p>
             <a:pPr algn="l" eaLnBrk="1" latinLnBrk="0" hangingPunct="1"/>
             <a:endParaRPr kumimoji="0" lang="en-US"/>
@@ -1726,9 +1683,7 @@
         </p:style>
         <p:txBody>
           <a:bodyPr anchor="ctr"/>
-          <a:lstStyle>
-            <a:extLst/>
-          </a:lstStyle>
+          <a:lstStyle/>
           <a:p>
             <a:pPr algn="l" eaLnBrk="1" latinLnBrk="0" hangingPunct="1"/>
             <a:endParaRPr kumimoji="0" lang="en-US"/>
@@ -1744,7 +1699,7 @@
 </file>
 
 <file path=ppt/slideLayouts/slideLayout4.xml><?xml version="1.0" encoding="utf-8"?>
-<p:sldLayout xmlns:a="http://schemas.openxmlformats.org/drawingml/2006/main" xmlns:r="http://schemas.openxmlformats.org/officeDocument/2006/relationships" xmlns:p="http://schemas.openxmlformats.org/presentationml/2006/main" type="twoObj" preserve="1">
+<p:sldLayout xmlns:a="http://schemas.openxmlformats.org/drawingml/2006/main" xmlns:r="http://schemas.openxmlformats.org/officeDocument/2006/relationships" xmlns:mc="http://schemas.openxmlformats.org/markup-compatibility/2006" xmlns:mv="urn:schemas-microsoft-com:mac:vml" xmlns:p="http://schemas.openxmlformats.org/presentationml/2006/main" mc:Ignorable="mv" mc:PreserveAttributes="mv:*" type="twoObj" preserve="1">
   <p:cSld name="Two Content">
     <p:bg>
       <p:bgRef idx="1002">
@@ -1799,7 +1754,6 @@
             <a:lvl5pPr>
               <a:defRPr sz="1800"/>
             </a:lvl5pPr>
-            <a:extLst/>
           </a:lstStyle>
           <a:p>
             <a:pPr lvl="0" eaLnBrk="1" latinLnBrk="0" hangingPunct="1"/>
@@ -1873,7 +1827,6 @@
             <a:lvl5pPr>
               <a:defRPr sz="1800"/>
             </a:lvl5pPr>
-            <a:extLst/>
           </a:lstStyle>
           <a:p>
             <a:pPr lvl="0" eaLnBrk="1" latinLnBrk="0" hangingPunct="1"/>
@@ -1926,13 +1879,12 @@
         <p:spPr/>
         <p:txBody>
           <a:bodyPr/>
-          <a:lstStyle>
-            <a:extLst/>
-          </a:lstStyle>
+          <a:lstStyle/>
           <a:p>
             <a:fld id="{578D3EDA-CDD4-4B8C-8889-A1E60E6090FC}" type="datetimeFigureOut">
               <a:rPr lang="en-US" smtClean="0"/>
-              <a:t>3/17/13</a:t>
+              <a:pPr/>
+              <a:t>3/18/13</a:t>
             </a:fld>
             <a:endParaRPr lang="en-US"/>
           </a:p>
@@ -1951,9 +1903,7 @@
         <p:spPr/>
         <p:txBody>
           <a:bodyPr/>
-          <a:lstStyle>
-            <a:extLst/>
-          </a:lstStyle>
+          <a:lstStyle/>
           <a:p>
             <a:endParaRPr lang="en-US"/>
           </a:p>
@@ -1972,12 +1922,11 @@
         <p:spPr/>
         <p:txBody>
           <a:bodyPr/>
-          <a:lstStyle>
-            <a:extLst/>
-          </a:lstStyle>
+          <a:lstStyle/>
           <a:p>
             <a:fld id="{C766FA25-E0A3-4D46-9455-78B8C0E697F6}" type="slidenum">
               <a:rPr lang="en-US" smtClean="0"/>
+              <a:pPr/>
               <a:t>‹#›</a:t>
             </a:fld>
             <a:endParaRPr lang="en-US"/>
@@ -1997,9 +1946,7 @@
         <p:spPr/>
         <p:txBody>
           <a:bodyPr rtlCol="0"/>
-          <a:lstStyle>
-            <a:extLst/>
-          </a:lstStyle>
+          <a:lstStyle/>
           <a:p>
             <a:r>
               <a:rPr kumimoji="0" lang="en-US" smtClean="0"/>
@@ -2018,7 +1965,7 @@
 </file>
 
 <file path=ppt/slideLayouts/slideLayout5.xml><?xml version="1.0" encoding="utf-8"?>
-<p:sldLayout xmlns:a="http://schemas.openxmlformats.org/drawingml/2006/main" xmlns:r="http://schemas.openxmlformats.org/officeDocument/2006/relationships" xmlns:p="http://schemas.openxmlformats.org/presentationml/2006/main" showMasterSp="0" type="twoTxTwoObj" preserve="1">
+<p:sldLayout xmlns:a="http://schemas.openxmlformats.org/drawingml/2006/main" xmlns:r="http://schemas.openxmlformats.org/officeDocument/2006/relationships" xmlns:mc="http://schemas.openxmlformats.org/markup-compatibility/2006" xmlns:mv="urn:schemas-microsoft-com:mac:vml" xmlns:p="http://schemas.openxmlformats.org/presentationml/2006/main" mc:Ignorable="mv" mc:PreserveAttributes="mv:*" showMasterSp="0" type="twoTxTwoObj" preserve="1">
   <p:cSld name="Comparison">
     <p:bg>
       <p:bgRef idx="1003">
@@ -2061,7 +2008,6 @@
             <a:lvl1pPr>
               <a:defRPr/>
             </a:lvl1pPr>
-            <a:extLst/>
           </a:lstStyle>
           <a:p>
             <a:r>
@@ -2124,7 +2070,6 @@
               <a:buNone/>
               <a:defRPr sz="1600" b="1"/>
             </a:lvl5pPr>
-            <a:extLst/>
           </a:lstStyle>
           <a:p>
             <a:pPr lvl="0" eaLnBrk="1" latinLnBrk="0" hangingPunct="1"/>
@@ -2187,7 +2132,6 @@
               <a:buNone/>
               <a:defRPr sz="1600" b="1"/>
             </a:lvl5pPr>
-            <a:extLst/>
           </a:lstStyle>
           <a:p>
             <a:pPr lvl="0" eaLnBrk="1" latinLnBrk="0" hangingPunct="1"/>
@@ -2237,7 +2181,6 @@
             <a:lvl5pPr>
               <a:defRPr sz="1600"/>
             </a:lvl5pPr>
-            <a:extLst/>
           </a:lstStyle>
           <a:p>
             <a:pPr lvl="0" eaLnBrk="1" latinLnBrk="0" hangingPunct="1"/>
@@ -2319,7 +2262,6 @@
             <a:lvl5pPr>
               <a:defRPr sz="1600"/>
             </a:lvl5pPr>
-            <a:extLst/>
           </a:lstStyle>
           <a:p>
             <a:pPr lvl="0" eaLnBrk="1" latinLnBrk="0" hangingPunct="1"/>
@@ -2372,13 +2314,12 @@
         <p:spPr/>
         <p:txBody>
           <a:bodyPr/>
-          <a:lstStyle>
-            <a:extLst/>
-          </a:lstStyle>
+          <a:lstStyle/>
           <a:p>
             <a:fld id="{578D3EDA-CDD4-4B8C-8889-A1E60E6090FC}" type="datetimeFigureOut">
               <a:rPr lang="en-US" smtClean="0"/>
-              <a:t>3/17/13</a:t>
+              <a:pPr/>
+              <a:t>3/18/13</a:t>
             </a:fld>
             <a:endParaRPr lang="en-US"/>
           </a:p>
@@ -2397,9 +2338,7 @@
         <p:spPr/>
         <p:txBody>
           <a:bodyPr/>
-          <a:lstStyle>
-            <a:extLst/>
-          </a:lstStyle>
+          <a:lstStyle/>
           <a:p>
             <a:endParaRPr lang="en-US"/>
           </a:p>
@@ -2418,12 +2357,11 @@
         <p:spPr/>
         <p:txBody>
           <a:bodyPr/>
-          <a:lstStyle>
-            <a:extLst/>
-          </a:lstStyle>
+          <a:lstStyle/>
           <a:p>
             <a:fld id="{C766FA25-E0A3-4D46-9455-78B8C0E697F6}" type="slidenum">
               <a:rPr lang="en-US" smtClean="0"/>
+              <a:pPr/>
               <a:t>‹#›</a:t>
             </a:fld>
             <a:endParaRPr lang="en-US"/>
@@ -2439,7 +2377,7 @@
 </file>
 
 <file path=ppt/slideLayouts/slideLayout6.xml><?xml version="1.0" encoding="utf-8"?>
-<p:sldLayout xmlns:a="http://schemas.openxmlformats.org/drawingml/2006/main" xmlns:r="http://schemas.openxmlformats.org/officeDocument/2006/relationships" xmlns:p="http://schemas.openxmlformats.org/presentationml/2006/main" type="titleOnly" preserve="1">
+<p:sldLayout xmlns:a="http://schemas.openxmlformats.org/drawingml/2006/main" xmlns:r="http://schemas.openxmlformats.org/officeDocument/2006/relationships" xmlns:mc="http://schemas.openxmlformats.org/markup-compatibility/2006" xmlns:mv="urn:schemas-microsoft-com:mac:vml" xmlns:p="http://schemas.openxmlformats.org/presentationml/2006/main" mc:Ignorable="mv" mc:PreserveAttributes="mv:*" type="titleOnly" preserve="1">
   <p:cSld name="Title Only">
     <p:bg>
       <p:bgRef idx="1002">
@@ -2473,13 +2411,12 @@
         <p:spPr/>
         <p:txBody>
           <a:bodyPr/>
-          <a:lstStyle>
-            <a:extLst/>
-          </a:lstStyle>
+          <a:lstStyle/>
           <a:p>
             <a:fld id="{578D3EDA-CDD4-4B8C-8889-A1E60E6090FC}" type="datetimeFigureOut">
               <a:rPr lang="en-US" smtClean="0"/>
-              <a:t>3/17/13</a:t>
+              <a:pPr/>
+              <a:t>3/18/13</a:t>
             </a:fld>
             <a:endParaRPr lang="en-US"/>
           </a:p>
@@ -2498,9 +2435,7 @@
         <p:spPr/>
         <p:txBody>
           <a:bodyPr/>
-          <a:lstStyle>
-            <a:extLst/>
-          </a:lstStyle>
+          <a:lstStyle/>
           <a:p>
             <a:endParaRPr lang="en-US"/>
           </a:p>
@@ -2519,12 +2454,11 @@
         <p:spPr/>
         <p:txBody>
           <a:bodyPr/>
-          <a:lstStyle>
-            <a:extLst/>
-          </a:lstStyle>
+          <a:lstStyle/>
           <a:p>
             <a:fld id="{C766FA25-E0A3-4D46-9455-78B8C0E697F6}" type="slidenum">
               <a:rPr lang="en-US" smtClean="0"/>
+              <a:pPr/>
               <a:t>‹#›</a:t>
             </a:fld>
             <a:endParaRPr lang="en-US"/>
@@ -2544,9 +2478,7 @@
         <p:spPr/>
         <p:txBody>
           <a:bodyPr rtlCol="0"/>
-          <a:lstStyle>
-            <a:extLst/>
-          </a:lstStyle>
+          <a:lstStyle/>
           <a:p>
             <a:r>
               <a:rPr kumimoji="0" lang="en-US" smtClean="0"/>
@@ -2565,7 +2497,7 @@
 </file>
 
 <file path=ppt/slideLayouts/slideLayout7.xml><?xml version="1.0" encoding="utf-8"?>
-<p:sldLayout xmlns:a="http://schemas.openxmlformats.org/drawingml/2006/main" xmlns:r="http://schemas.openxmlformats.org/officeDocument/2006/relationships" xmlns:p="http://schemas.openxmlformats.org/presentationml/2006/main" type="blank" preserve="1">
+<p:sldLayout xmlns:a="http://schemas.openxmlformats.org/drawingml/2006/main" xmlns:r="http://schemas.openxmlformats.org/officeDocument/2006/relationships" xmlns:mc="http://schemas.openxmlformats.org/markup-compatibility/2006" xmlns:mv="urn:schemas-microsoft-com:mac:vml" xmlns:p="http://schemas.openxmlformats.org/presentationml/2006/main" mc:Ignorable="mv" mc:PreserveAttributes="mv:*" type="blank" preserve="1">
   <p:cSld name="Blank">
     <p:spTree>
       <p:nvGrpSpPr>
@@ -2594,13 +2526,12 @@
         <p:spPr/>
         <p:txBody>
           <a:bodyPr/>
-          <a:lstStyle>
-            <a:extLst/>
-          </a:lstStyle>
+          <a:lstStyle/>
           <a:p>
             <a:fld id="{578D3EDA-CDD4-4B8C-8889-A1E60E6090FC}" type="datetimeFigureOut">
               <a:rPr lang="en-US" smtClean="0"/>
-              <a:t>3/17/13</a:t>
+              <a:pPr/>
+              <a:t>3/18/13</a:t>
             </a:fld>
             <a:endParaRPr lang="en-US"/>
           </a:p>
@@ -2619,9 +2550,7 @@
         <p:spPr/>
         <p:txBody>
           <a:bodyPr/>
-          <a:lstStyle>
-            <a:extLst/>
-          </a:lstStyle>
+          <a:lstStyle/>
           <a:p>
             <a:endParaRPr lang="en-US"/>
           </a:p>
@@ -2640,12 +2569,11 @@
         <p:spPr/>
         <p:txBody>
           <a:bodyPr/>
-          <a:lstStyle>
-            <a:extLst/>
-          </a:lstStyle>
+          <a:lstStyle/>
           <a:p>
             <a:fld id="{C766FA25-E0A3-4D46-9455-78B8C0E697F6}" type="slidenum">
               <a:rPr lang="en-US" smtClean="0"/>
+              <a:pPr/>
               <a:t>‹#›</a:t>
             </a:fld>
             <a:endParaRPr lang="en-US"/>
@@ -2661,7 +2589,7 @@
 </file>
 
 <file path=ppt/slideLayouts/slideLayout8.xml><?xml version="1.0" encoding="utf-8"?>
-<p:sldLayout xmlns:a="http://schemas.openxmlformats.org/drawingml/2006/main" xmlns:r="http://schemas.openxmlformats.org/officeDocument/2006/relationships" xmlns:p="http://schemas.openxmlformats.org/presentationml/2006/main" showMasterSp="0" type="objTx" preserve="1">
+<p:sldLayout xmlns:a="http://schemas.openxmlformats.org/drawingml/2006/main" xmlns:r="http://schemas.openxmlformats.org/officeDocument/2006/relationships" xmlns:mc="http://schemas.openxmlformats.org/markup-compatibility/2006" xmlns:mv="urn:schemas-microsoft-com:mac:vml" xmlns:p="http://schemas.openxmlformats.org/presentationml/2006/main" mc:Ignorable="mv" mc:PreserveAttributes="mv:*" showMasterSp="0" type="objTx" preserve="1">
   <p:cSld name="Content with Caption">
     <p:bg>
       <p:bgRef idx="1003">
@@ -2715,7 +2643,6 @@
                 <a:effectLst/>
               </a:defRPr>
             </a:lvl1pPr>
-            <a:extLst/>
           </a:lstStyle>
           <a:p>
             <a:r>
@@ -2765,7 +2692,6 @@
               <a:buNone/>
               <a:defRPr sz="900"/>
             </a:lvl5pPr>
-            <a:extLst/>
           </a:lstStyle>
           <a:p>
             <a:pPr lvl="0" eaLnBrk="1" latinLnBrk="0" hangingPunct="1"/>
@@ -2810,7 +2736,6 @@
             <a:lvl5pPr>
               <a:defRPr sz="2000"/>
             </a:lvl5pPr>
-            <a:extLst/>
           </a:lstStyle>
           <a:p>
             <a:pPr lvl="0" eaLnBrk="1" latinLnBrk="0" hangingPunct="1"/>
@@ -2868,13 +2793,12 @@
         </p:spPr>
         <p:txBody>
           <a:bodyPr/>
-          <a:lstStyle>
-            <a:extLst/>
-          </a:lstStyle>
+          <a:lstStyle/>
           <a:p>
             <a:fld id="{578D3EDA-CDD4-4B8C-8889-A1E60E6090FC}" type="datetimeFigureOut">
               <a:rPr lang="en-US" smtClean="0"/>
-              <a:t>3/17/13</a:t>
+              <a:pPr/>
+              <a:t>3/18/13</a:t>
             </a:fld>
             <a:endParaRPr lang="en-US"/>
           </a:p>
@@ -2893,9 +2817,7 @@
         <p:spPr/>
         <p:txBody>
           <a:bodyPr/>
-          <a:lstStyle>
-            <a:extLst/>
-          </a:lstStyle>
+          <a:lstStyle/>
           <a:p>
             <a:endParaRPr lang="en-US"/>
           </a:p>
@@ -2914,12 +2836,11 @@
         <p:spPr/>
         <p:txBody>
           <a:bodyPr/>
-          <a:lstStyle>
-            <a:extLst/>
-          </a:lstStyle>
+          <a:lstStyle/>
           <a:p>
             <a:fld id="{C766FA25-E0A3-4D46-9455-78B8C0E697F6}" type="slidenum">
               <a:rPr lang="en-US" smtClean="0"/>
+              <a:pPr/>
               <a:t>‹#›</a:t>
             </a:fld>
             <a:endParaRPr lang="en-US"/>
@@ -2935,7 +2856,7 @@
 </file>
 
 <file path=ppt/slideLayouts/slideLayout9.xml><?xml version="1.0" encoding="utf-8"?>
-<p:sldLayout xmlns:a="http://schemas.openxmlformats.org/drawingml/2006/main" xmlns:r="http://schemas.openxmlformats.org/officeDocument/2006/relationships" xmlns:p="http://schemas.openxmlformats.org/presentationml/2006/main" showMasterSp="0" type="picTx" preserve="1">
+<p:sldLayout xmlns:a="http://schemas.openxmlformats.org/drawingml/2006/main" xmlns:r="http://schemas.openxmlformats.org/officeDocument/2006/relationships" xmlns:mc="http://schemas.openxmlformats.org/markup-compatibility/2006" xmlns:mv="urn:schemas-microsoft-com:mac:vml" xmlns:p="http://schemas.openxmlformats.org/presentationml/2006/main" mc:Ignorable="mv" mc:PreserveAttributes="mv:*" showMasterSp="0" type="picTx" preserve="1">
   <p:cSld name="Picture with Caption">
     <p:bg>
       <p:bgRef idx="1002">
@@ -2992,7 +2913,6 @@
             <a:lvl5pPr>
               <a:defRPr sz="900"/>
             </a:lvl5pPr>
-            <a:extLst/>
           </a:lstStyle>
           <a:p>
             <a:pPr lvl="0" eaLnBrk="1" latinLnBrk="0" hangingPunct="1"/>
@@ -3042,7 +2962,6 @@
               <a:buNone/>
               <a:defRPr sz="3200"/>
             </a:lvl1pPr>
-            <a:extLst/>
           </a:lstStyle>
           <a:p>
             <a:r>
@@ -3074,12 +2993,12 @@
                 </a:solidFill>
               </a:defRPr>
             </a:lvl1pPr>
-            <a:extLst/>
           </a:lstStyle>
           <a:p>
             <a:fld id="{578D3EDA-CDD4-4B8C-8889-A1E60E6090FC}" type="datetimeFigureOut">
               <a:rPr lang="en-US" smtClean="0"/>
-              <a:t>3/17/13</a:t>
+              <a:pPr/>
+              <a:t>3/18/13</a:t>
             </a:fld>
             <a:endParaRPr lang="en-US"/>
           </a:p>
@@ -3111,7 +3030,6 @@
                 </a:solidFill>
               </a:defRPr>
             </a:lvl1pPr>
-            <a:extLst/>
           </a:lstStyle>
           <a:p>
             <a:endParaRPr lang="en-US"/>
@@ -3139,11 +3057,11 @@
                 </a:solidFill>
               </a:defRPr>
             </a:lvl1pPr>
-            <a:extLst/>
           </a:lstStyle>
           <a:p>
             <a:fld id="{C766FA25-E0A3-4D46-9455-78B8C0E697F6}" type="slidenum">
               <a:rPr lang="en-US" smtClean="0"/>
+              <a:pPr/>
               <a:t>‹#›</a:t>
             </a:fld>
             <a:endParaRPr lang="en-US"/>
@@ -3187,7 +3105,6 @@
                 </a:effectLst>
               </a:defRPr>
             </a:lvl1pPr>
-            <a:extLst/>
           </a:lstStyle>
           <a:p>
             <a:r>
@@ -3274,9 +3191,7 @@
         </p:spPr>
         <p:txBody>
           <a:bodyPr vert="horz" wrap="square" lIns="91440" tIns="45720" rIns="91440" bIns="45720" anchor="t" compatLnSpc="1"/>
-          <a:lstStyle>
-            <a:extLst/>
-          </a:lstStyle>
+          <a:lstStyle/>
           <a:p>
             <a:endParaRPr kumimoji="0" lang="en-US"/>
           </a:p>
@@ -3356,9 +3271,7 @@
         </p:spPr>
         <p:txBody>
           <a:bodyPr vert="horz" wrap="square" lIns="91440" tIns="45720" rIns="91440" bIns="45720" anchor="t" compatLnSpc="1"/>
-          <a:lstStyle>
-            <a:extLst/>
-          </a:lstStyle>
+          <a:lstStyle/>
           <a:p>
             <a:endParaRPr kumimoji="0" lang="en-US"/>
           </a:p>
@@ -3466,9 +3379,7 @@
         </p:style>
         <p:txBody>
           <a:bodyPr vert="horz" wrap="square" lIns="91440" tIns="45720" rIns="91440" bIns="45720" anchor="ctr" compatLnSpc="1"/>
-          <a:lstStyle>
-            <a:extLst/>
-          </a:lstStyle>
+          <a:lstStyle/>
           <a:p>
             <a:pPr algn="ctr" eaLnBrk="1" latinLnBrk="0" hangingPunct="1"/>
             <a:endParaRPr kumimoji="0" lang="en-US"/>
@@ -3599,9 +3510,7 @@
         </p:style>
         <p:txBody>
           <a:bodyPr anchor="ctr"/>
-          <a:lstStyle>
-            <a:extLst/>
-          </a:lstStyle>
+          <a:lstStyle/>
           <a:p>
             <a:pPr algn="l" eaLnBrk="1" latinLnBrk="0" hangingPunct="1"/>
             <a:endParaRPr kumimoji="0" lang="en-US"/>
@@ -3679,9 +3588,7 @@
         </p:style>
         <p:txBody>
           <a:bodyPr anchor="ctr"/>
-          <a:lstStyle>
-            <a:extLst/>
-          </a:lstStyle>
+          <a:lstStyle/>
           <a:p>
             <a:pPr algn="l" eaLnBrk="1" latinLnBrk="0" hangingPunct="1"/>
             <a:endParaRPr kumimoji="0" lang="en-US"/>
@@ -3697,7 +3604,7 @@
 </file>
 
 <file path=ppt/slideMasters/slideMaster1.xml><?xml version="1.0" encoding="utf-8"?>
-<p:sldMaster xmlns:a="http://schemas.openxmlformats.org/drawingml/2006/main" xmlns:r="http://schemas.openxmlformats.org/officeDocument/2006/relationships" xmlns:p="http://schemas.openxmlformats.org/presentationml/2006/main">
+<p:sldMaster xmlns:a="http://schemas.openxmlformats.org/drawingml/2006/main" xmlns:r="http://schemas.openxmlformats.org/officeDocument/2006/relationships" xmlns:mc="http://schemas.openxmlformats.org/markup-compatibility/2006" xmlns:mv="urn:schemas-microsoft-com:mac:vml" xmlns:p="http://schemas.openxmlformats.org/presentationml/2006/main" mc:Ignorable="mv" mc:PreserveAttributes="mv:*">
   <p:cSld>
     <p:bg>
       <p:bgRef idx="1001">
@@ -3794,9 +3701,7 @@
         </p:spPr>
         <p:txBody>
           <a:bodyPr vert="horz" wrap="square" lIns="91440" tIns="45720" rIns="91440" bIns="45720" anchor="t" compatLnSpc="1"/>
-          <a:lstStyle>
-            <a:extLst/>
-          </a:lstStyle>
+          <a:lstStyle/>
           <a:p>
             <a:endParaRPr kumimoji="0" lang="en-US"/>
           </a:p>
@@ -3876,9 +3781,7 @@
         </p:spPr>
         <p:txBody>
           <a:bodyPr vert="horz" wrap="square" lIns="91440" tIns="45720" rIns="91440" bIns="45720" anchor="t" compatLnSpc="1"/>
-          <a:lstStyle>
-            <a:extLst/>
-          </a:lstStyle>
+          <a:lstStyle/>
           <a:p>
             <a:endParaRPr kumimoji="0" lang="en-US"/>
           </a:p>
@@ -3986,9 +3889,7 @@
         </p:style>
         <p:txBody>
           <a:bodyPr vert="horz" wrap="square" lIns="91440" tIns="45720" rIns="91440" bIns="45720" anchor="ctr" compatLnSpc="1"/>
-          <a:lstStyle>
-            <a:extLst/>
-          </a:lstStyle>
+          <a:lstStyle/>
           <a:p>
             <a:pPr algn="ctr" eaLnBrk="1" latinLnBrk="0" hangingPunct="1"/>
             <a:endParaRPr kumimoji="0" lang="en-US"/>
@@ -4078,9 +3979,7 @@
               <a:bevelT w="25400" h="25400"/>
             </a:sp3d>
           </a:bodyPr>
-          <a:lstStyle>
-            <a:extLst/>
-          </a:lstStyle>
+          <a:lstStyle/>
           <a:p>
             <a:r>
               <a:rPr kumimoji="0" lang="en-US" smtClean="0"/>
@@ -4113,9 +4012,7 @@
           <a:bodyPr vert="horz">
             <a:normAutofit/>
           </a:bodyPr>
-          <a:lstStyle>
-            <a:extLst/>
-          </a:lstStyle>
+          <a:lstStyle/>
           <a:p>
             <a:pPr lvl="0" eaLnBrk="1" latinLnBrk="0" hangingPunct="1"/>
             <a:r>
@@ -4183,12 +4080,12 @@
                 </a:solidFill>
               </a:defRPr>
             </a:lvl1pPr>
-            <a:extLst/>
           </a:lstStyle>
           <a:p>
             <a:fld id="{578D3EDA-CDD4-4B8C-8889-A1E60E6090FC}" type="datetimeFigureOut">
               <a:rPr lang="en-US" smtClean="0"/>
-              <a:t>3/17/13</a:t>
+              <a:pPr/>
+              <a:t>3/18/13</a:t>
             </a:fld>
             <a:endParaRPr lang="en-US"/>
           </a:p>
@@ -4223,7 +4120,6 @@
                 </a:solidFill>
               </a:defRPr>
             </a:lvl1pPr>
-            <a:extLst/>
           </a:lstStyle>
           <a:p>
             <a:endParaRPr lang="en-US"/>
@@ -4259,11 +4155,11 @@
                 </a:solidFill>
               </a:defRPr>
             </a:lvl1pPr>
-            <a:extLst/>
           </a:lstStyle>
           <a:p>
             <a:fld id="{C766FA25-E0A3-4D46-9455-78B8C0E697F6}" type="slidenum">
               <a:rPr lang="en-US" smtClean="0"/>
+              <a:pPr/>
               <a:t>‹#›</a:t>
             </a:fld>
             <a:endParaRPr lang="en-US"/>
@@ -4309,7 +4205,6 @@
           <a:cs typeface="+mj-cs"/>
         </a:defRPr>
       </a:lvl1pPr>
-      <a:extLst/>
     </p:titleStyle>
     <p:bodyStyle>
       <a:lvl1pPr marL="365760" indent="-256032" algn="l" rtl="0" eaLnBrk="1" latinLnBrk="0" hangingPunct="1">
@@ -4479,7 +4374,6 @@
           <a:cs typeface="+mn-cs"/>
         </a:defRPr>
       </a:lvl9pPr>
-      <a:extLst/>
     </p:bodyStyle>
     <p:otherStyle>
       <a:lvl1pPr marL="0" algn="l" rtl="0" eaLnBrk="1" latinLnBrk="0" hangingPunct="1">
@@ -4572,14 +4466,13 @@
           <a:cs typeface="+mn-cs"/>
         </a:defRPr>
       </a:lvl9pPr>
-      <a:extLst/>
     </p:otherStyle>
   </p:txStyles>
 </p:sldMaster>
 </file>
 
 <file path=ppt/slides/slide1.xml><?xml version="1.0" encoding="utf-8"?>
-<p:sld xmlns:a="http://schemas.openxmlformats.org/drawingml/2006/main" xmlns:r="http://schemas.openxmlformats.org/officeDocument/2006/relationships" xmlns:p="http://schemas.openxmlformats.org/presentationml/2006/main">
+<p:sld xmlns:a="http://schemas.openxmlformats.org/drawingml/2006/main" xmlns:r="http://schemas.openxmlformats.org/officeDocument/2006/relationships" xmlns:mc="http://schemas.openxmlformats.org/markup-compatibility/2006" xmlns:mv="urn:schemas-microsoft-com:mac:vml" xmlns:p="http://schemas.openxmlformats.org/presentationml/2006/main" mc:Ignorable="mv" mc:PreserveAttributes="mv:*">
   <p:cSld>
     <p:spTree>
       <p:nvGrpSpPr>
@@ -4697,7 +4590,7 @@
     </p:spTree>
     <p:extLst>
       <p:ext uri="{BB962C8B-B14F-4D97-AF65-F5344CB8AC3E}">
-        <p14:creationId xmlns:p14="http://schemas.microsoft.com/office/powerpoint/2010/main" val="38165764"/>
+        <p14:creationId xmlns:p14="http://schemas.microsoft.com/office/powerpoint/2010/main" xmlns:p="http://schemas.openxmlformats.org/presentationml/2006/main" xmlns:r="http://schemas.openxmlformats.org/officeDocument/2006/relationships" xmlns:a="http://schemas.openxmlformats.org/drawingml/2006/main" xmlns="" val="38165764"/>
       </p:ext>
     </p:extLst>
   </p:cSld>
@@ -4707,7 +4600,7 @@
   <p:timing>
     <p:tnLst>
       <p:par>
-        <p:cTn xmlns:p14="http://schemas.microsoft.com/office/powerpoint/2010/main" id="1" dur="indefinite" restart="never" nodeType="tmRoot"/>
+        <p:cTn id="1" dur="indefinite" restart="never" nodeType="tmRoot"/>
       </p:par>
     </p:tnLst>
   </p:timing>
@@ -4715,7 +4608,7 @@
 </file>
 
 <file path=ppt/slides/slide2.xml><?xml version="1.0" encoding="utf-8"?>
-<p:sld xmlns:a="http://schemas.openxmlformats.org/drawingml/2006/main" xmlns:r="http://schemas.openxmlformats.org/officeDocument/2006/relationships" xmlns:p="http://schemas.openxmlformats.org/presentationml/2006/main">
+<p:sld xmlns:a="http://schemas.openxmlformats.org/drawingml/2006/main" xmlns:r="http://schemas.openxmlformats.org/officeDocument/2006/relationships" xmlns:mc="http://schemas.openxmlformats.org/markup-compatibility/2006" xmlns:mv="urn:schemas-microsoft-com:mac:vml" xmlns:p="http://schemas.openxmlformats.org/presentationml/2006/main" mc:Ignorable="mv" mc:PreserveAttributes="mv:*">
   <p:cSld>
     <p:spTree>
       <p:nvGrpSpPr>
@@ -4776,7 +4669,7 @@
     </p:spTree>
     <p:extLst>
       <p:ext uri="{BB962C8B-B14F-4D97-AF65-F5344CB8AC3E}">
-        <p14:creationId xmlns:p14="http://schemas.microsoft.com/office/powerpoint/2010/main" val="3947077150"/>
+        <p14:creationId xmlns:p14="http://schemas.microsoft.com/office/powerpoint/2010/main" xmlns:p="http://schemas.openxmlformats.org/presentationml/2006/main" xmlns:r="http://schemas.openxmlformats.org/officeDocument/2006/relationships" xmlns:a="http://schemas.openxmlformats.org/drawingml/2006/main" xmlns="" val="3947077150"/>
       </p:ext>
     </p:extLst>
   </p:cSld>
@@ -4787,7 +4680,7 @@
 </file>
 
 <file path=ppt/slides/slide3.xml><?xml version="1.0" encoding="utf-8"?>
-<p:sld xmlns:a="http://schemas.openxmlformats.org/drawingml/2006/main" xmlns:r="http://schemas.openxmlformats.org/officeDocument/2006/relationships" xmlns:p="http://schemas.openxmlformats.org/presentationml/2006/main">
+<p:sld xmlns:a="http://schemas.openxmlformats.org/drawingml/2006/main" xmlns:r="http://schemas.openxmlformats.org/officeDocument/2006/relationships" xmlns:mc="http://schemas.openxmlformats.org/markup-compatibility/2006" xmlns:mv="urn:schemas-microsoft-com:mac:vml" xmlns:p="http://schemas.openxmlformats.org/presentationml/2006/main" mc:Ignorable="mv" mc:PreserveAttributes="mv:*">
   <p:cSld>
     <p:spTree>
       <p:nvGrpSpPr>
@@ -4848,7 +4741,7 @@
     </p:spTree>
     <p:extLst>
       <p:ext uri="{BB962C8B-B14F-4D97-AF65-F5344CB8AC3E}">
-        <p14:creationId xmlns:p14="http://schemas.microsoft.com/office/powerpoint/2010/main" val="699070470"/>
+        <p14:creationId xmlns:p14="http://schemas.microsoft.com/office/powerpoint/2010/main" xmlns:p="http://schemas.openxmlformats.org/presentationml/2006/main" xmlns:r="http://schemas.openxmlformats.org/officeDocument/2006/relationships" xmlns:a="http://schemas.openxmlformats.org/drawingml/2006/main" xmlns="" val="699070470"/>
       </p:ext>
     </p:extLst>
   </p:cSld>
@@ -4859,7 +4752,7 @@
 </file>
 
 <file path=ppt/slides/slide4.xml><?xml version="1.0" encoding="utf-8"?>
-<p:sld xmlns:a="http://schemas.openxmlformats.org/drawingml/2006/main" xmlns:r="http://schemas.openxmlformats.org/officeDocument/2006/relationships" xmlns:p="http://schemas.openxmlformats.org/presentationml/2006/main">
+<p:sld xmlns:a="http://schemas.openxmlformats.org/drawingml/2006/main" xmlns:r="http://schemas.openxmlformats.org/officeDocument/2006/relationships" xmlns:mc="http://schemas.openxmlformats.org/markup-compatibility/2006" xmlns:mv="urn:schemas-microsoft-com:mac:vml" xmlns:p="http://schemas.openxmlformats.org/presentationml/2006/main" mc:Ignorable="mv" mc:PreserveAttributes="mv:*">
   <p:cSld>
     <p:spTree>
       <p:nvGrpSpPr>
@@ -4974,7 +4867,7 @@
     </p:spTree>
     <p:extLst>
       <p:ext uri="{BB962C8B-B14F-4D97-AF65-F5344CB8AC3E}">
-        <p14:creationId xmlns:p14="http://schemas.microsoft.com/office/powerpoint/2010/main" val="552368841"/>
+        <p14:creationId xmlns:p14="http://schemas.microsoft.com/office/powerpoint/2010/main" xmlns:p="http://schemas.openxmlformats.org/presentationml/2006/main" xmlns:r="http://schemas.openxmlformats.org/officeDocument/2006/relationships" xmlns:a="http://schemas.openxmlformats.org/drawingml/2006/main" xmlns="" val="552368841"/>
       </p:ext>
     </p:extLst>
   </p:cSld>
@@ -4985,7 +4878,7 @@
 </file>
 
 <file path=ppt/slides/slide5.xml><?xml version="1.0" encoding="utf-8"?>
-<p:sld xmlns:a="http://schemas.openxmlformats.org/drawingml/2006/main" xmlns:r="http://schemas.openxmlformats.org/officeDocument/2006/relationships" xmlns:p="http://schemas.openxmlformats.org/presentationml/2006/main">
+<p:sld xmlns:a="http://schemas.openxmlformats.org/drawingml/2006/main" xmlns:r="http://schemas.openxmlformats.org/officeDocument/2006/relationships" xmlns:mc="http://schemas.openxmlformats.org/markup-compatibility/2006" xmlns:mv="urn:schemas-microsoft-com:mac:vml" xmlns:p="http://schemas.openxmlformats.org/presentationml/2006/main" mc:Ignorable="mv" mc:PreserveAttributes="mv:*">
   <p:cSld>
     <p:spTree>
       <p:nvGrpSpPr>
@@ -5016,7 +4909,58 @@
           <a:bodyPr/>
           <a:lstStyle/>
           <a:p>
-            <a:endParaRPr lang="en-US"/>
+            <a:r>
+              <a:rPr lang="en-US" dirty="0" smtClean="0"/>
+              <a:t>Additional design features for debugger</a:t>
+            </a:r>
+          </a:p>
+          <a:p>
+            <a:pPr lvl="1"/>
+            <a:r>
+              <a:rPr lang="en-US" dirty="0" smtClean="0"/>
+              <a:t>Methods for setting break points, displaying variables, etc.</a:t>
+            </a:r>
+          </a:p>
+          <a:p>
+            <a:r>
+              <a:rPr lang="en-US" dirty="0" smtClean="0"/>
+              <a:t>Add details for connection</a:t>
+            </a:r>
+          </a:p>
+          <a:p>
+            <a:pPr lvl="1"/>
+            <a:r>
+              <a:rPr lang="en-US" dirty="0" smtClean="0"/>
+              <a:t>Everything the </a:t>
+            </a:r>
+            <a:r>
+              <a:rPr lang="en-US" dirty="0" err="1" smtClean="0"/>
+              <a:t>nxt</a:t>
+            </a:r>
+            <a:r>
+              <a:rPr lang="en-US" dirty="0" smtClean="0"/>
+              <a:t> needs to create a connection</a:t>
+            </a:r>
+          </a:p>
+          <a:p>
+            <a:r>
+              <a:rPr lang="en-US" dirty="0" smtClean="0"/>
+              <a:t>Add details for timer</a:t>
+            </a:r>
+          </a:p>
+          <a:p>
+            <a:pPr lvl="1"/>
+            <a:r>
+              <a:rPr lang="en-US" dirty="0" smtClean="0"/>
+              <a:t>Research java timer classes/methods</a:t>
+            </a:r>
+          </a:p>
+          <a:p>
+            <a:r>
+              <a:rPr lang="en-US" dirty="0" smtClean="0"/>
+              <a:t>Possibly add fields to Message Handler Class</a:t>
+            </a:r>
+            <a:endParaRPr lang="en-US" dirty="0"/>
           </a:p>
         </p:txBody>
       </p:sp>
@@ -5046,7 +4990,7 @@
     </p:spTree>
     <p:extLst>
       <p:ext uri="{BB962C8B-B14F-4D97-AF65-F5344CB8AC3E}">
-        <p14:creationId xmlns:p14="http://schemas.microsoft.com/office/powerpoint/2010/main" val="3802318836"/>
+        <p14:creationId xmlns:p14="http://schemas.microsoft.com/office/powerpoint/2010/main" xmlns:p="http://schemas.openxmlformats.org/presentationml/2006/main" xmlns:r="http://schemas.openxmlformats.org/officeDocument/2006/relationships" xmlns:a="http://schemas.openxmlformats.org/drawingml/2006/main" xmlns="" val="3802318836"/>
       </p:ext>
     </p:extLst>
   </p:cSld>
@@ -5057,7 +5001,7 @@
 </file>
 
 <file path=ppt/slides/slide6.xml><?xml version="1.0" encoding="utf-8"?>
-<p:sld xmlns:a="http://schemas.openxmlformats.org/drawingml/2006/main" xmlns:r="http://schemas.openxmlformats.org/officeDocument/2006/relationships" xmlns:p="http://schemas.openxmlformats.org/presentationml/2006/main">
+<p:sld xmlns:a="http://schemas.openxmlformats.org/drawingml/2006/main" xmlns:r="http://schemas.openxmlformats.org/officeDocument/2006/relationships" xmlns:mc="http://schemas.openxmlformats.org/markup-compatibility/2006" xmlns:mv="urn:schemas-microsoft-com:mac:vml" xmlns:p="http://schemas.openxmlformats.org/presentationml/2006/main" mc:Ignorable="mv" mc:PreserveAttributes="mv:*">
   <p:cSld>
     <p:spTree>
       <p:nvGrpSpPr>
@@ -5083,14 +5027,30 @@
             <p:ph idx="1"/>
           </p:nvPr>
         </p:nvSpPr>
-        <p:spPr/>
+        <p:spPr>
+          <a:xfrm>
+            <a:off x="457200" y="1481328"/>
+            <a:ext cx="8229600" cy="4614672"/>
+          </a:xfrm>
+        </p:spPr>
         <p:txBody>
           <a:bodyPr/>
           <a:lstStyle/>
           <a:p>
             <a:r>
               <a:rPr lang="en-US" dirty="0" smtClean="0"/>
-              <a:t>Time spent on design</a:t>
+              <a:t>Time spent on </a:t>
+            </a:r>
+            <a:r>
+              <a:rPr lang="en-US" dirty="0" smtClean="0"/>
+              <a:t>design</a:t>
+            </a:r>
+          </a:p>
+          <a:p>
+            <a:pPr lvl="1"/>
+            <a:r>
+              <a:rPr lang="en-US" dirty="0" smtClean="0"/>
+              <a:t>Approx. 2 hours discussing high level design</a:t>
             </a:r>
           </a:p>
           <a:p>
@@ -5100,9 +5060,48 @@
             </a:r>
           </a:p>
           <a:p>
+            <a:pPr lvl="1"/>
             <a:r>
               <a:rPr lang="en-US" dirty="0" smtClean="0"/>
-              <a:t>Risks</a:t>
+              <a:t>Sending multiple messages/acknowledgements</a:t>
+            </a:r>
+          </a:p>
+          <a:p>
+            <a:pPr lvl="1"/>
+            <a:r>
+              <a:rPr lang="en-US" dirty="0" smtClean="0"/>
+              <a:t>Decoding messages</a:t>
+            </a:r>
+          </a:p>
+          <a:p>
+            <a:r>
+              <a:rPr lang="en-US" dirty="0" smtClean="0"/>
+              <a:t>Major Risks</a:t>
+            </a:r>
+          </a:p>
+          <a:p>
+            <a:pPr lvl="1"/>
+            <a:r>
+              <a:rPr lang="en-US" dirty="0" smtClean="0"/>
+              <a:t>Should we allow sending multiple messages before receiving an acknowledgment?</a:t>
+            </a:r>
+          </a:p>
+          <a:p>
+            <a:pPr lvl="1"/>
+            <a:r>
+              <a:rPr lang="en-US" dirty="0" smtClean="0"/>
+              <a:t>How to decode message in Message Handler Class for use in Driver class to </a:t>
+            </a:r>
+            <a:r>
+              <a:rPr lang="en-US" dirty="0" smtClean="0"/>
+              <a:t>implement action</a:t>
+            </a:r>
+          </a:p>
+          <a:p>
+            <a:pPr lvl="1"/>
+            <a:r>
+              <a:rPr lang="en-US" dirty="0" smtClean="0"/>
+              <a:t>Design details of debugger – how to set breakpoints </a:t>
             </a:r>
             <a:endParaRPr lang="en-US" dirty="0"/>
           </a:p>
@@ -5134,7 +5133,7 @@
     </p:spTree>
     <p:extLst>
       <p:ext uri="{BB962C8B-B14F-4D97-AF65-F5344CB8AC3E}">
-        <p14:creationId xmlns:p14="http://schemas.microsoft.com/office/powerpoint/2010/main" val="1418246983"/>
+        <p14:creationId xmlns:p14="http://schemas.microsoft.com/office/powerpoint/2010/main" xmlns:p="http://schemas.openxmlformats.org/presentationml/2006/main" xmlns:r="http://schemas.openxmlformats.org/officeDocument/2006/relationships" xmlns:a="http://schemas.openxmlformats.org/drawingml/2006/main" xmlns="" val="1418246983"/>
       </p:ext>
     </p:extLst>
   </p:cSld>

</xml_diff>

<commit_message>
Overview added to presentation
</commit_message>
<xml_diff>
--- a/Presentations/RoboticorpLab5.pptx
+++ b/Presentations/RoboticorpLab5.pptx
@@ -1,6 +1,6 @@
 
 <file path=ppt/presentation.xml><?xml version="1.0" encoding="utf-8"?>
-<p:presentation xmlns:a="http://schemas.openxmlformats.org/drawingml/2006/main" xmlns:r="http://schemas.openxmlformats.org/officeDocument/2006/relationships" xmlns:p="http://schemas.openxmlformats.org/presentationml/2006/main" saveSubsetFonts="1">
+<p:presentation xmlns:a="http://schemas.openxmlformats.org/drawingml/2006/main" xmlns:r="http://schemas.openxmlformats.org/officeDocument/2006/relationships" xmlns:mc="http://schemas.openxmlformats.org/markup-compatibility/2006" xmlns:mv="urn:schemas-microsoft-com:mac:vml" xmlns:p="http://schemas.openxmlformats.org/presentationml/2006/main" mc:Ignorable="mv" mc:PreserveAttributes="mv:*" saveSubsetFonts="1">
   <p:sldMasterIdLst>
     <p:sldMasterId id="2147483660" r:id="rId1"/>
   </p:sldMasterIdLst>
@@ -114,7 +114,7 @@
 </file>
 
 <file path=ppt/slideLayouts/slideLayout1.xml><?xml version="1.0" encoding="utf-8"?>
-<p:sldLayout xmlns:a="http://schemas.openxmlformats.org/drawingml/2006/main" xmlns:r="http://schemas.openxmlformats.org/officeDocument/2006/relationships" xmlns:p="http://schemas.openxmlformats.org/presentationml/2006/main" showMasterSp="0" type="title" preserve="1">
+<p:sldLayout xmlns:a="http://schemas.openxmlformats.org/drawingml/2006/main" xmlns:r="http://schemas.openxmlformats.org/officeDocument/2006/relationships" xmlns:mc="http://schemas.openxmlformats.org/markup-compatibility/2006" xmlns:mv="urn:schemas-microsoft-com:mac:vml" xmlns:p="http://schemas.openxmlformats.org/presentationml/2006/main" mc:Ignorable="mv" mc:PreserveAttributes="mv:*" showMasterSp="0" type="title" preserve="1">
   <p:cSld name="Title Slide">
     <p:spTree>
       <p:nvGrpSpPr>
@@ -728,7 +728,7 @@
             <a:fld id="{578D3EDA-CDD4-4B8C-8889-A1E60E6090FC}" type="datetimeFigureOut">
               <a:rPr lang="en-US" smtClean="0"/>
               <a:pPr/>
-              <a:t>3/18/2013</a:t>
+              <a:t>3/18/13</a:t>
             </a:fld>
             <a:endParaRPr lang="en-US"/>
           </a:p>
@@ -804,7 +804,7 @@
 </file>
 
 <file path=ppt/slideLayouts/slideLayout10.xml><?xml version="1.0" encoding="utf-8"?>
-<p:sldLayout xmlns:a="http://schemas.openxmlformats.org/drawingml/2006/main" xmlns:r="http://schemas.openxmlformats.org/officeDocument/2006/relationships" xmlns:p="http://schemas.openxmlformats.org/presentationml/2006/main" type="vertTx" preserve="1">
+<p:sldLayout xmlns:a="http://schemas.openxmlformats.org/drawingml/2006/main" xmlns:r="http://schemas.openxmlformats.org/officeDocument/2006/relationships" xmlns:mc="http://schemas.openxmlformats.org/markup-compatibility/2006" xmlns:mv="urn:schemas-microsoft-com:mac:vml" xmlns:p="http://schemas.openxmlformats.org/presentationml/2006/main" mc:Ignorable="mv" mc:PreserveAttributes="mv:*" type="vertTx" preserve="1">
   <p:cSld name="Title and Vertical Text">
     <p:spTree>
       <p:nvGrpSpPr>
@@ -918,7 +918,7 @@
             <a:fld id="{578D3EDA-CDD4-4B8C-8889-A1E60E6090FC}" type="datetimeFigureOut">
               <a:rPr lang="en-US" smtClean="0"/>
               <a:pPr/>
-              <a:t>3/18/2013</a:t>
+              <a:t>3/18/13</a:t>
             </a:fld>
             <a:endParaRPr lang="en-US"/>
           </a:p>
@@ -976,7 +976,7 @@
 </file>
 
 <file path=ppt/slideLayouts/slideLayout11.xml><?xml version="1.0" encoding="utf-8"?>
-<p:sldLayout xmlns:a="http://schemas.openxmlformats.org/drawingml/2006/main" xmlns:r="http://schemas.openxmlformats.org/officeDocument/2006/relationships" xmlns:p="http://schemas.openxmlformats.org/presentationml/2006/main" type="vertTitleAndTx" preserve="1">
+<p:sldLayout xmlns:a="http://schemas.openxmlformats.org/drawingml/2006/main" xmlns:r="http://schemas.openxmlformats.org/officeDocument/2006/relationships" xmlns:mc="http://schemas.openxmlformats.org/markup-compatibility/2006" xmlns:mv="urn:schemas-microsoft-com:mac:vml" xmlns:p="http://schemas.openxmlformats.org/presentationml/2006/main" mc:Ignorable="mv" mc:PreserveAttributes="mv:*" type="vertTitleAndTx" preserve="1">
   <p:cSld name="Vertical Title and Text">
     <p:spTree>
       <p:nvGrpSpPr>
@@ -1095,7 +1095,7 @@
             <a:fld id="{578D3EDA-CDD4-4B8C-8889-A1E60E6090FC}" type="datetimeFigureOut">
               <a:rPr lang="en-US" smtClean="0"/>
               <a:pPr/>
-              <a:t>3/18/2013</a:t>
+              <a:t>3/18/13</a:t>
             </a:fld>
             <a:endParaRPr lang="en-US"/>
           </a:p>
@@ -1153,7 +1153,7 @@
 </file>
 
 <file path=ppt/slideLayouts/slideLayout2.xml><?xml version="1.0" encoding="utf-8"?>
-<p:sldLayout xmlns:a="http://schemas.openxmlformats.org/drawingml/2006/main" xmlns:r="http://schemas.openxmlformats.org/officeDocument/2006/relationships" xmlns:p="http://schemas.openxmlformats.org/presentationml/2006/main" type="obj" preserve="1">
+<p:sldLayout xmlns:a="http://schemas.openxmlformats.org/drawingml/2006/main" xmlns:r="http://schemas.openxmlformats.org/officeDocument/2006/relationships" xmlns:mc="http://schemas.openxmlformats.org/markup-compatibility/2006" xmlns:mv="urn:schemas-microsoft-com:mac:vml" xmlns:p="http://schemas.openxmlformats.org/presentationml/2006/main" mc:Ignorable="mv" mc:PreserveAttributes="mv:*" type="obj" preserve="1">
   <p:cSld name="Title and Content">
     <p:spTree>
       <p:nvGrpSpPr>
@@ -1239,7 +1239,7 @@
             <a:fld id="{578D3EDA-CDD4-4B8C-8889-A1E60E6090FC}" type="datetimeFigureOut">
               <a:rPr lang="en-US" smtClean="0"/>
               <a:pPr/>
-              <a:t>3/18/2013</a:t>
+              <a:t>3/18/13</a:t>
             </a:fld>
             <a:endParaRPr lang="en-US"/>
           </a:p>
@@ -1320,7 +1320,7 @@
 </file>
 
 <file path=ppt/slideLayouts/slideLayout3.xml><?xml version="1.0" encoding="utf-8"?>
-<p:sldLayout xmlns:a="http://schemas.openxmlformats.org/drawingml/2006/main" xmlns:r="http://schemas.openxmlformats.org/officeDocument/2006/relationships" xmlns:p="http://schemas.openxmlformats.org/presentationml/2006/main" type="secHead" preserve="1">
+<p:sldLayout xmlns:a="http://schemas.openxmlformats.org/drawingml/2006/main" xmlns:r="http://schemas.openxmlformats.org/officeDocument/2006/relationships" xmlns:mc="http://schemas.openxmlformats.org/markup-compatibility/2006" xmlns:mv="urn:schemas-microsoft-com:mac:vml" xmlns:p="http://schemas.openxmlformats.org/presentationml/2006/main" mc:Ignorable="mv" mc:PreserveAttributes="mv:*" type="secHead" preserve="1">
   <p:cSld name="Section Header">
     <p:bg>
       <p:bgRef idx="1002">
@@ -1486,7 +1486,7 @@
             <a:fld id="{578D3EDA-CDD4-4B8C-8889-A1E60E6090FC}" type="datetimeFigureOut">
               <a:rPr lang="en-US" smtClean="0"/>
               <a:pPr/>
-              <a:t>3/18/2013</a:t>
+              <a:t>3/18/13</a:t>
             </a:fld>
             <a:endParaRPr lang="en-US"/>
           </a:p>
@@ -1700,7 +1700,7 @@
 </file>
 
 <file path=ppt/slideLayouts/slideLayout4.xml><?xml version="1.0" encoding="utf-8"?>
-<p:sldLayout xmlns:a="http://schemas.openxmlformats.org/drawingml/2006/main" xmlns:r="http://schemas.openxmlformats.org/officeDocument/2006/relationships" xmlns:p="http://schemas.openxmlformats.org/presentationml/2006/main" type="twoObj" preserve="1">
+<p:sldLayout xmlns:a="http://schemas.openxmlformats.org/drawingml/2006/main" xmlns:r="http://schemas.openxmlformats.org/officeDocument/2006/relationships" xmlns:mc="http://schemas.openxmlformats.org/markup-compatibility/2006" xmlns:mv="urn:schemas-microsoft-com:mac:vml" xmlns:p="http://schemas.openxmlformats.org/presentationml/2006/main" mc:Ignorable="mv" mc:PreserveAttributes="mv:*" type="twoObj" preserve="1">
   <p:cSld name="Two Content">
     <p:bg>
       <p:bgRef idx="1002">
@@ -1885,7 +1885,7 @@
             <a:fld id="{578D3EDA-CDD4-4B8C-8889-A1E60E6090FC}" type="datetimeFigureOut">
               <a:rPr lang="en-US" smtClean="0"/>
               <a:pPr/>
-              <a:t>3/18/2013</a:t>
+              <a:t>3/18/13</a:t>
             </a:fld>
             <a:endParaRPr lang="en-US"/>
           </a:p>
@@ -1966,7 +1966,7 @@
 </file>
 
 <file path=ppt/slideLayouts/slideLayout5.xml><?xml version="1.0" encoding="utf-8"?>
-<p:sldLayout xmlns:a="http://schemas.openxmlformats.org/drawingml/2006/main" xmlns:r="http://schemas.openxmlformats.org/officeDocument/2006/relationships" xmlns:p="http://schemas.openxmlformats.org/presentationml/2006/main" showMasterSp="0" type="twoTxTwoObj" preserve="1">
+<p:sldLayout xmlns:a="http://schemas.openxmlformats.org/drawingml/2006/main" xmlns:r="http://schemas.openxmlformats.org/officeDocument/2006/relationships" xmlns:mc="http://schemas.openxmlformats.org/markup-compatibility/2006" xmlns:mv="urn:schemas-microsoft-com:mac:vml" xmlns:p="http://schemas.openxmlformats.org/presentationml/2006/main" mc:Ignorable="mv" mc:PreserveAttributes="mv:*" showMasterSp="0" type="twoTxTwoObj" preserve="1">
   <p:cSld name="Comparison">
     <p:bg>
       <p:bgRef idx="1003">
@@ -2320,7 +2320,7 @@
             <a:fld id="{578D3EDA-CDD4-4B8C-8889-A1E60E6090FC}" type="datetimeFigureOut">
               <a:rPr lang="en-US" smtClean="0"/>
               <a:pPr/>
-              <a:t>3/18/2013</a:t>
+              <a:t>3/18/13</a:t>
             </a:fld>
             <a:endParaRPr lang="en-US"/>
           </a:p>
@@ -2378,7 +2378,7 @@
 </file>
 
 <file path=ppt/slideLayouts/slideLayout6.xml><?xml version="1.0" encoding="utf-8"?>
-<p:sldLayout xmlns:a="http://schemas.openxmlformats.org/drawingml/2006/main" xmlns:r="http://schemas.openxmlformats.org/officeDocument/2006/relationships" xmlns:p="http://schemas.openxmlformats.org/presentationml/2006/main" type="titleOnly" preserve="1">
+<p:sldLayout xmlns:a="http://schemas.openxmlformats.org/drawingml/2006/main" xmlns:r="http://schemas.openxmlformats.org/officeDocument/2006/relationships" xmlns:mc="http://schemas.openxmlformats.org/markup-compatibility/2006" xmlns:mv="urn:schemas-microsoft-com:mac:vml" xmlns:p="http://schemas.openxmlformats.org/presentationml/2006/main" mc:Ignorable="mv" mc:PreserveAttributes="mv:*" type="titleOnly" preserve="1">
   <p:cSld name="Title Only">
     <p:bg>
       <p:bgRef idx="1002">
@@ -2417,7 +2417,7 @@
             <a:fld id="{578D3EDA-CDD4-4B8C-8889-A1E60E6090FC}" type="datetimeFigureOut">
               <a:rPr lang="en-US" smtClean="0"/>
               <a:pPr/>
-              <a:t>3/18/2013</a:t>
+              <a:t>3/18/13</a:t>
             </a:fld>
             <a:endParaRPr lang="en-US"/>
           </a:p>
@@ -2498,7 +2498,7 @@
 </file>
 
 <file path=ppt/slideLayouts/slideLayout7.xml><?xml version="1.0" encoding="utf-8"?>
-<p:sldLayout xmlns:a="http://schemas.openxmlformats.org/drawingml/2006/main" xmlns:r="http://schemas.openxmlformats.org/officeDocument/2006/relationships" xmlns:p="http://schemas.openxmlformats.org/presentationml/2006/main" type="blank" preserve="1">
+<p:sldLayout xmlns:a="http://schemas.openxmlformats.org/drawingml/2006/main" xmlns:r="http://schemas.openxmlformats.org/officeDocument/2006/relationships" xmlns:mc="http://schemas.openxmlformats.org/markup-compatibility/2006" xmlns:mv="urn:schemas-microsoft-com:mac:vml" xmlns:p="http://schemas.openxmlformats.org/presentationml/2006/main" mc:Ignorable="mv" mc:PreserveAttributes="mv:*" type="blank" preserve="1">
   <p:cSld name="Blank">
     <p:spTree>
       <p:nvGrpSpPr>
@@ -2532,7 +2532,7 @@
             <a:fld id="{578D3EDA-CDD4-4B8C-8889-A1E60E6090FC}" type="datetimeFigureOut">
               <a:rPr lang="en-US" smtClean="0"/>
               <a:pPr/>
-              <a:t>3/18/2013</a:t>
+              <a:t>3/18/13</a:t>
             </a:fld>
             <a:endParaRPr lang="en-US"/>
           </a:p>
@@ -2590,7 +2590,7 @@
 </file>
 
 <file path=ppt/slideLayouts/slideLayout8.xml><?xml version="1.0" encoding="utf-8"?>
-<p:sldLayout xmlns:a="http://schemas.openxmlformats.org/drawingml/2006/main" xmlns:r="http://schemas.openxmlformats.org/officeDocument/2006/relationships" xmlns:p="http://schemas.openxmlformats.org/presentationml/2006/main" showMasterSp="0" type="objTx" preserve="1">
+<p:sldLayout xmlns:a="http://schemas.openxmlformats.org/drawingml/2006/main" xmlns:r="http://schemas.openxmlformats.org/officeDocument/2006/relationships" xmlns:mc="http://schemas.openxmlformats.org/markup-compatibility/2006" xmlns:mv="urn:schemas-microsoft-com:mac:vml" xmlns:p="http://schemas.openxmlformats.org/presentationml/2006/main" mc:Ignorable="mv" mc:PreserveAttributes="mv:*" showMasterSp="0" type="objTx" preserve="1">
   <p:cSld name="Content with Caption">
     <p:bg>
       <p:bgRef idx="1003">
@@ -2799,7 +2799,7 @@
             <a:fld id="{578D3EDA-CDD4-4B8C-8889-A1E60E6090FC}" type="datetimeFigureOut">
               <a:rPr lang="en-US" smtClean="0"/>
               <a:pPr/>
-              <a:t>3/18/2013</a:t>
+              <a:t>3/18/13</a:t>
             </a:fld>
             <a:endParaRPr lang="en-US"/>
           </a:p>
@@ -2857,7 +2857,7 @@
 </file>
 
 <file path=ppt/slideLayouts/slideLayout9.xml><?xml version="1.0" encoding="utf-8"?>
-<p:sldLayout xmlns:a="http://schemas.openxmlformats.org/drawingml/2006/main" xmlns:r="http://schemas.openxmlformats.org/officeDocument/2006/relationships" xmlns:p="http://schemas.openxmlformats.org/presentationml/2006/main" showMasterSp="0" type="picTx" preserve="1">
+<p:sldLayout xmlns:a="http://schemas.openxmlformats.org/drawingml/2006/main" xmlns:r="http://schemas.openxmlformats.org/officeDocument/2006/relationships" xmlns:mc="http://schemas.openxmlformats.org/markup-compatibility/2006" xmlns:mv="urn:schemas-microsoft-com:mac:vml" xmlns:p="http://schemas.openxmlformats.org/presentationml/2006/main" mc:Ignorable="mv" mc:PreserveAttributes="mv:*" showMasterSp="0" type="picTx" preserve="1">
   <p:cSld name="Picture with Caption">
     <p:bg>
       <p:bgRef idx="1002">
@@ -2999,7 +2999,7 @@
             <a:fld id="{578D3EDA-CDD4-4B8C-8889-A1E60E6090FC}" type="datetimeFigureOut">
               <a:rPr lang="en-US" smtClean="0"/>
               <a:pPr/>
-              <a:t>3/18/2013</a:t>
+              <a:t>3/18/13</a:t>
             </a:fld>
             <a:endParaRPr lang="en-US"/>
           </a:p>
@@ -3605,7 +3605,7 @@
 </file>
 
 <file path=ppt/slideMasters/slideMaster1.xml><?xml version="1.0" encoding="utf-8"?>
-<p:sldMaster xmlns:a="http://schemas.openxmlformats.org/drawingml/2006/main" xmlns:r="http://schemas.openxmlformats.org/officeDocument/2006/relationships" xmlns:p="http://schemas.openxmlformats.org/presentationml/2006/main">
+<p:sldMaster xmlns:a="http://schemas.openxmlformats.org/drawingml/2006/main" xmlns:r="http://schemas.openxmlformats.org/officeDocument/2006/relationships" xmlns:mc="http://schemas.openxmlformats.org/markup-compatibility/2006" xmlns:mv="urn:schemas-microsoft-com:mac:vml" xmlns:p="http://schemas.openxmlformats.org/presentationml/2006/main" mc:Ignorable="mv" mc:PreserveAttributes="mv:*">
   <p:cSld>
     <p:bg>
       <p:bgRef idx="1001">
@@ -4086,7 +4086,7 @@
             <a:fld id="{578D3EDA-CDD4-4B8C-8889-A1E60E6090FC}" type="datetimeFigureOut">
               <a:rPr lang="en-US" smtClean="0"/>
               <a:pPr/>
-              <a:t>3/18/2013</a:t>
+              <a:t>3/18/13</a:t>
             </a:fld>
             <a:endParaRPr lang="en-US"/>
           </a:p>
@@ -4473,7 +4473,7 @@
 </file>
 
 <file path=ppt/slides/slide1.xml><?xml version="1.0" encoding="utf-8"?>
-<p:sld xmlns:a="http://schemas.openxmlformats.org/drawingml/2006/main" xmlns:r="http://schemas.openxmlformats.org/officeDocument/2006/relationships" xmlns:p="http://schemas.openxmlformats.org/presentationml/2006/main">
+<p:sld xmlns:a="http://schemas.openxmlformats.org/drawingml/2006/main" xmlns:r="http://schemas.openxmlformats.org/officeDocument/2006/relationships" xmlns:mc="http://schemas.openxmlformats.org/markup-compatibility/2006" xmlns:mv="urn:schemas-microsoft-com:mac:vml" xmlns:p="http://schemas.openxmlformats.org/presentationml/2006/main" mc:Ignorable="mv" mc:PreserveAttributes="mv:*">
   <p:cSld>
     <p:spTree>
       <p:nvGrpSpPr>
@@ -4591,7 +4591,7 @@
     </p:spTree>
     <p:extLst>
       <p:ext uri="{BB962C8B-B14F-4D97-AF65-F5344CB8AC3E}">
-        <p14:creationId xmlns:p14="http://schemas.microsoft.com/office/powerpoint/2010/main" val="38165764"/>
+        <p14:creationId xmlns:p14="http://schemas.microsoft.com/office/powerpoint/2010/main" xmlns:p="http://schemas.openxmlformats.org/presentationml/2006/main" xmlns:r="http://schemas.openxmlformats.org/officeDocument/2006/relationships" xmlns:a="http://schemas.openxmlformats.org/drawingml/2006/main" xmlns="" val="38165764"/>
       </p:ext>
     </p:extLst>
   </p:cSld>
@@ -4609,7 +4609,7 @@
 </file>
 
 <file path=ppt/slides/slide2.xml><?xml version="1.0" encoding="utf-8"?>
-<p:sld xmlns:a="http://schemas.openxmlformats.org/drawingml/2006/main" xmlns:r="http://schemas.openxmlformats.org/officeDocument/2006/relationships" xmlns:p="http://schemas.openxmlformats.org/presentationml/2006/main">
+<p:sld xmlns:a="http://schemas.openxmlformats.org/drawingml/2006/main" xmlns:r="http://schemas.openxmlformats.org/officeDocument/2006/relationships" xmlns:mc="http://schemas.openxmlformats.org/markup-compatibility/2006" xmlns:mv="urn:schemas-microsoft-com:mac:vml" xmlns:p="http://schemas.openxmlformats.org/presentationml/2006/main" mc:Ignorable="mv" mc:PreserveAttributes="mv:*">
   <p:cSld>
     <p:spTree>
       <p:nvGrpSpPr>
@@ -4635,12 +4635,82 @@
             <p:ph idx="1"/>
           </p:nvPr>
         </p:nvSpPr>
-        <p:spPr/>
+        <p:spPr>
+          <a:xfrm>
+            <a:off x="457200" y="1481328"/>
+            <a:ext cx="8229600" cy="4690872"/>
+          </a:xfrm>
+        </p:spPr>
         <p:txBody>
           <a:bodyPr/>
           <a:lstStyle/>
           <a:p>
-            <a:endParaRPr lang="en-US"/>
+            <a:r>
+              <a:rPr lang="en-US" dirty="0" smtClean="0"/>
+              <a:t>Structure: Face page, </a:t>
+            </a:r>
+            <a:r>
+              <a:rPr lang="en-US" dirty="0" smtClean="0"/>
+              <a:t>approval, contents</a:t>
+            </a:r>
+          </a:p>
+          <a:p>
+            <a:r>
+              <a:rPr lang="en-US" dirty="0" smtClean="0"/>
+              <a:t>Description in natural language</a:t>
+            </a:r>
+          </a:p>
+          <a:p>
+            <a:pPr lvl="1"/>
+            <a:r>
+              <a:rPr lang="en-US" dirty="0" smtClean="0"/>
+              <a:t>3 classes: Activator, Driver, Message Handler</a:t>
+            </a:r>
+          </a:p>
+          <a:p>
+            <a:pPr lvl="1"/>
+            <a:r>
+              <a:rPr lang="en-US" dirty="0" smtClean="0"/>
+              <a:t>Activator makes connection, sends and receives messages, and has instances of Driver and Message Handler</a:t>
+            </a:r>
+          </a:p>
+          <a:p>
+            <a:pPr lvl="1"/>
+            <a:r>
+              <a:rPr lang="en-US" dirty="0" smtClean="0"/>
+              <a:t>Driver controls robot movement</a:t>
+            </a:r>
+          </a:p>
+          <a:p>
+            <a:pPr lvl="1"/>
+            <a:r>
+              <a:rPr lang="en-US" dirty="0" smtClean="0"/>
+              <a:t>Message Handler decodes, encodes, and verifies messages</a:t>
+            </a:r>
+          </a:p>
+          <a:p>
+            <a:r>
+              <a:rPr lang="en-US" dirty="0" smtClean="0"/>
+              <a:t>UML Class Diagram</a:t>
+            </a:r>
+          </a:p>
+          <a:p>
+            <a:r>
+              <a:rPr lang="en-US" dirty="0" smtClean="0"/>
+              <a:t>For </a:t>
+            </a:r>
+            <a:r>
+              <a:rPr lang="en-US" dirty="0" err="1" smtClean="0"/>
+              <a:t>postlab</a:t>
+            </a:r>
+            <a:r>
+              <a:rPr lang="en-US" dirty="0" smtClean="0"/>
+              <a:t>: UML sequence diagram</a:t>
+            </a:r>
+          </a:p>
+          <a:p>
+            <a:pPr lvl="2"/>
+            <a:endParaRPr lang="en-US" dirty="0"/>
           </a:p>
         </p:txBody>
       </p:sp>
@@ -4656,12 +4726,14 @@
         </p:nvSpPr>
         <p:spPr/>
         <p:txBody>
-          <a:bodyPr/>
+          <a:bodyPr>
+            <a:normAutofit fontScale="90000"/>
+          </a:bodyPr>
           <a:lstStyle/>
           <a:p>
             <a:r>
               <a:rPr lang="en-US" dirty="0" smtClean="0"/>
-              <a:t>Overview</a:t>
+              <a:t>Overview of Design Documentation</a:t>
             </a:r>
             <a:endParaRPr lang="en-US" dirty="0"/>
           </a:p>
@@ -4670,7 +4742,7 @@
     </p:spTree>
     <p:extLst>
       <p:ext uri="{BB962C8B-B14F-4D97-AF65-F5344CB8AC3E}">
-        <p14:creationId xmlns:p14="http://schemas.microsoft.com/office/powerpoint/2010/main" val="3947077150"/>
+        <p14:creationId xmlns:p14="http://schemas.microsoft.com/office/powerpoint/2010/main" xmlns:p="http://schemas.openxmlformats.org/presentationml/2006/main" xmlns:r="http://schemas.openxmlformats.org/officeDocument/2006/relationships" xmlns:a="http://schemas.openxmlformats.org/drawingml/2006/main" xmlns="" val="3947077150"/>
       </p:ext>
     </p:extLst>
   </p:cSld>
@@ -4681,7 +4753,7 @@
 </file>
 
 <file path=ppt/slides/slide3.xml><?xml version="1.0" encoding="utf-8"?>
-<p:sld xmlns:a="http://schemas.openxmlformats.org/drawingml/2006/main" xmlns:r="http://schemas.openxmlformats.org/officeDocument/2006/relationships" xmlns:p="http://schemas.openxmlformats.org/presentationml/2006/main">
+<p:sld xmlns:a="http://schemas.openxmlformats.org/drawingml/2006/main" xmlns:r="http://schemas.openxmlformats.org/officeDocument/2006/relationships" xmlns:mc="http://schemas.openxmlformats.org/markup-compatibility/2006" xmlns:mv="urn:schemas-microsoft-com:mac:vml" xmlns:p="http://schemas.openxmlformats.org/presentationml/2006/main" mc:Ignorable="mv" mc:PreserveAttributes="mv:*">
   <p:cSld>
     <p:spTree>
       <p:nvGrpSpPr>
@@ -4707,14 +4779,14 @@
             <p:ph idx="1"/>
             <p:extLst>
               <p:ext uri="{D42A27DB-BD31-4B8C-83A1-F6EECF244321}">
-                <p14:modId xmlns:p14="http://schemas.microsoft.com/office/powerpoint/2010/main" val="1793952450"/>
+                <p14:modId xmlns:p14="http://schemas.microsoft.com/office/powerpoint/2010/main" xmlns:p="http://schemas.openxmlformats.org/presentationml/2006/main" xmlns:r="http://schemas.openxmlformats.org/officeDocument/2006/relationships" xmlns:a="http://schemas.openxmlformats.org/drawingml/2006/main" xmlns="" val="1793952450"/>
               </p:ext>
             </p:extLst>
           </p:nvPr>
         </p:nvGraphicFramePr>
         <p:xfrm>
           <a:off x="3354388" y="1261110"/>
-          <a:ext cx="2434590" cy="3354705"/>
+          <a:ext cx="2434590" cy="3438525"/>
         </p:xfrm>
         <a:graphic>
           <a:graphicData uri="http://schemas.openxmlformats.org/drawingml/2006/table">
@@ -5067,14 +5139,14 @@
           <a:effectLst/>
           <a:extLst>
             <a:ext uri="{909E8E84-426E-40DD-AFC4-6F175D3DCCD1}">
-              <a14:hiddenFill xmlns:a14="http://schemas.microsoft.com/office/drawing/2010/main">
+              <a14:hiddenFill xmlns:a14="http://schemas.microsoft.com/office/drawing/2010/main" xmlns:p="http://schemas.openxmlformats.org/presentationml/2006/main" xmlns:r="http://schemas.openxmlformats.org/officeDocument/2006/relationships" xmlns:a="http://schemas.openxmlformats.org/drawingml/2006/main" xmlns="">
                 <a:solidFill>
                   <a:schemeClr val="accent1"/>
                 </a:solidFill>
               </a14:hiddenFill>
             </a:ext>
             <a:ext uri="{91240B29-F687-4F45-9708-019B960494DF}">
-              <a14:hiddenLine xmlns:a14="http://schemas.microsoft.com/office/drawing/2010/main" w="9525">
+              <a14:hiddenLine xmlns:a14="http://schemas.microsoft.com/office/drawing/2010/main" xmlns:p="http://schemas.openxmlformats.org/presentationml/2006/main" xmlns:r="http://schemas.openxmlformats.org/officeDocument/2006/relationships" xmlns:a="http://schemas.openxmlformats.org/drawingml/2006/main" xmlns="" w="9525">
                 <a:solidFill>
                   <a:schemeClr val="tx1"/>
                 </a:solidFill>
@@ -5084,7 +5156,7 @@
               </a14:hiddenLine>
             </a:ext>
             <a:ext uri="{AF507438-7753-43E0-B8FC-AC1667EBCBE1}">
-              <a14:hiddenEffects xmlns:a14="http://schemas.microsoft.com/office/drawing/2010/main">
+              <a14:hiddenEffects xmlns:a14="http://schemas.microsoft.com/office/drawing/2010/main" xmlns:p="http://schemas.openxmlformats.org/presentationml/2006/main" xmlns:r="http://schemas.openxmlformats.org/officeDocument/2006/relationships" xmlns:a="http://schemas.openxmlformats.org/drawingml/2006/main" xmlns="">
                 <a:effectLst>
                   <a:outerShdw dist="35921" dir="2700000" algn="ctr" rotWithShape="0">
                     <a:schemeClr val="bg2"/>
@@ -5130,14 +5202,14 @@
           <a:effectLst/>
           <a:extLst>
             <a:ext uri="{909E8E84-426E-40DD-AFC4-6F175D3DCCD1}">
-              <a14:hiddenFill xmlns:a14="http://schemas.microsoft.com/office/drawing/2010/main">
+              <a14:hiddenFill xmlns:a14="http://schemas.microsoft.com/office/drawing/2010/main" xmlns:p="http://schemas.openxmlformats.org/presentationml/2006/main" xmlns:r="http://schemas.openxmlformats.org/officeDocument/2006/relationships" xmlns:a="http://schemas.openxmlformats.org/drawingml/2006/main" xmlns="">
                 <a:solidFill>
                   <a:schemeClr val="accent1"/>
                 </a:solidFill>
               </a14:hiddenFill>
             </a:ext>
             <a:ext uri="{91240B29-F687-4F45-9708-019B960494DF}">
-              <a14:hiddenLine xmlns:a14="http://schemas.microsoft.com/office/drawing/2010/main" w="9525">
+              <a14:hiddenLine xmlns:a14="http://schemas.microsoft.com/office/drawing/2010/main" xmlns:p="http://schemas.openxmlformats.org/presentationml/2006/main" xmlns:r="http://schemas.openxmlformats.org/officeDocument/2006/relationships" xmlns:a="http://schemas.openxmlformats.org/drawingml/2006/main" xmlns="" w="9525">
                 <a:solidFill>
                   <a:schemeClr val="tx1"/>
                 </a:solidFill>
@@ -5147,7 +5219,7 @@
               </a14:hiddenLine>
             </a:ext>
             <a:ext uri="{AF507438-7753-43E0-B8FC-AC1667EBCBE1}">
-              <a14:hiddenEffects xmlns:a14="http://schemas.microsoft.com/office/drawing/2010/main">
+              <a14:hiddenEffects xmlns:a14="http://schemas.microsoft.com/office/drawing/2010/main" xmlns:p="http://schemas.openxmlformats.org/presentationml/2006/main" xmlns:r="http://schemas.openxmlformats.org/officeDocument/2006/relationships" xmlns:a="http://schemas.openxmlformats.org/drawingml/2006/main" xmlns="">
                 <a:effectLst>
                   <a:outerShdw dist="35921" dir="2700000" algn="ctr" rotWithShape="0">
                     <a:schemeClr val="bg2"/>
@@ -5423,7 +5495,7 @@
     </p:spTree>
     <p:extLst>
       <p:ext uri="{BB962C8B-B14F-4D97-AF65-F5344CB8AC3E}">
-        <p14:creationId xmlns:p14="http://schemas.microsoft.com/office/powerpoint/2010/main" val="699070470"/>
+        <p14:creationId xmlns:p14="http://schemas.microsoft.com/office/powerpoint/2010/main" xmlns:p="http://schemas.openxmlformats.org/presentationml/2006/main" xmlns:r="http://schemas.openxmlformats.org/officeDocument/2006/relationships" xmlns:a="http://schemas.openxmlformats.org/drawingml/2006/main" xmlns="" val="699070470"/>
       </p:ext>
     </p:extLst>
   </p:cSld>
@@ -5434,7 +5506,7 @@
 </file>
 
 <file path=ppt/slides/slide4.xml><?xml version="1.0" encoding="utf-8"?>
-<p:sld xmlns:a="http://schemas.openxmlformats.org/drawingml/2006/main" xmlns:r="http://schemas.openxmlformats.org/officeDocument/2006/relationships" xmlns:p="http://schemas.openxmlformats.org/presentationml/2006/main">
+<p:sld xmlns:a="http://schemas.openxmlformats.org/drawingml/2006/main" xmlns:r="http://schemas.openxmlformats.org/officeDocument/2006/relationships" xmlns:mc="http://schemas.openxmlformats.org/markup-compatibility/2006" xmlns:mv="urn:schemas-microsoft-com:mac:vml" xmlns:p="http://schemas.openxmlformats.org/presentationml/2006/main" mc:Ignorable="mv" mc:PreserveAttributes="mv:*">
   <p:cSld>
     <p:spTree>
       <p:nvGrpSpPr>
@@ -5460,14 +5532,14 @@
             <p:ph idx="1"/>
             <p:extLst>
               <p:ext uri="{D42A27DB-BD31-4B8C-83A1-F6EECF244321}">
-                <p14:modId xmlns:p14="http://schemas.microsoft.com/office/powerpoint/2010/main" val="2366121319"/>
+                <p14:modId xmlns:p14="http://schemas.microsoft.com/office/powerpoint/2010/main" xmlns:p="http://schemas.openxmlformats.org/presentationml/2006/main" xmlns:r="http://schemas.openxmlformats.org/officeDocument/2006/relationships" xmlns:a="http://schemas.openxmlformats.org/drawingml/2006/main" xmlns="" val="2366121319"/>
               </p:ext>
             </p:extLst>
           </p:nvPr>
         </p:nvGraphicFramePr>
         <p:xfrm>
           <a:off x="5243212" y="2362200"/>
-          <a:ext cx="2715260" cy="3390900"/>
+          <a:ext cx="2715260" cy="3474720"/>
         </p:xfrm>
         <a:graphic>
           <a:graphicData uri="http://schemas.openxmlformats.org/drawingml/2006/table">
@@ -5761,14 +5833,14 @@
           <p:nvPr>
             <p:extLst>
               <p:ext uri="{D42A27DB-BD31-4B8C-83A1-F6EECF244321}">
-                <p14:modId xmlns:p14="http://schemas.microsoft.com/office/powerpoint/2010/main" val="1908427223"/>
+                <p14:modId xmlns:p14="http://schemas.microsoft.com/office/powerpoint/2010/main" xmlns:p="http://schemas.openxmlformats.org/presentationml/2006/main" xmlns:r="http://schemas.openxmlformats.org/officeDocument/2006/relationships" xmlns:a="http://schemas.openxmlformats.org/drawingml/2006/main" xmlns="" val="1908427223"/>
               </p:ext>
             </p:extLst>
           </p:nvPr>
         </p:nvGraphicFramePr>
         <p:xfrm>
           <a:off x="685800" y="2481263"/>
-          <a:ext cx="2319020" cy="3239294"/>
+          <a:ext cx="2319020" cy="3281204"/>
         </p:xfrm>
         <a:graphic>
           <a:graphicData uri="http://schemas.openxmlformats.org/drawingml/2006/table">
@@ -6097,14 +6169,14 @@
           <a:effectLst/>
           <a:extLst>
             <a:ext uri="{909E8E84-426E-40DD-AFC4-6F175D3DCCD1}">
-              <a14:hiddenFill xmlns:a14="http://schemas.microsoft.com/office/drawing/2010/main">
+              <a14:hiddenFill xmlns:a14="http://schemas.microsoft.com/office/drawing/2010/main" xmlns:p="http://schemas.openxmlformats.org/presentationml/2006/main" xmlns:r="http://schemas.openxmlformats.org/officeDocument/2006/relationships" xmlns:a="http://schemas.openxmlformats.org/drawingml/2006/main" xmlns="">
                 <a:solidFill>
                   <a:schemeClr val="accent1"/>
                 </a:solidFill>
               </a14:hiddenFill>
             </a:ext>
             <a:ext uri="{91240B29-F687-4F45-9708-019B960494DF}">
-              <a14:hiddenLine xmlns:a14="http://schemas.microsoft.com/office/drawing/2010/main" w="9525">
+              <a14:hiddenLine xmlns:a14="http://schemas.microsoft.com/office/drawing/2010/main" xmlns:p="http://schemas.openxmlformats.org/presentationml/2006/main" xmlns:r="http://schemas.openxmlformats.org/officeDocument/2006/relationships" xmlns:a="http://schemas.openxmlformats.org/drawingml/2006/main" xmlns="" w="9525">
                 <a:solidFill>
                   <a:schemeClr val="tx1"/>
                 </a:solidFill>
@@ -6114,7 +6186,7 @@
               </a14:hiddenLine>
             </a:ext>
             <a:ext uri="{AF507438-7753-43E0-B8FC-AC1667EBCBE1}">
-              <a14:hiddenEffects xmlns:a14="http://schemas.microsoft.com/office/drawing/2010/main">
+              <a14:hiddenEffects xmlns:a14="http://schemas.microsoft.com/office/drawing/2010/main" xmlns:p="http://schemas.openxmlformats.org/presentationml/2006/main" xmlns:r="http://schemas.openxmlformats.org/officeDocument/2006/relationships" xmlns:a="http://schemas.openxmlformats.org/drawingml/2006/main" xmlns="">
                 <a:effectLst>
                   <a:outerShdw dist="35921" dir="2700000" algn="ctr" rotWithShape="0">
                     <a:schemeClr val="bg2"/>
@@ -6215,14 +6287,14 @@
           <a:effectLst/>
           <a:extLst>
             <a:ext uri="{909E8E84-426E-40DD-AFC4-6F175D3DCCD1}">
-              <a14:hiddenFill xmlns:a14="http://schemas.microsoft.com/office/drawing/2010/main">
+              <a14:hiddenFill xmlns:a14="http://schemas.microsoft.com/office/drawing/2010/main" xmlns:p="http://schemas.openxmlformats.org/presentationml/2006/main" xmlns:r="http://schemas.openxmlformats.org/officeDocument/2006/relationships" xmlns:a="http://schemas.openxmlformats.org/drawingml/2006/main" xmlns="">
                 <a:solidFill>
                   <a:schemeClr val="accent1"/>
                 </a:solidFill>
               </a14:hiddenFill>
             </a:ext>
             <a:ext uri="{91240B29-F687-4F45-9708-019B960494DF}">
-              <a14:hiddenLine xmlns:a14="http://schemas.microsoft.com/office/drawing/2010/main" w="9525">
+              <a14:hiddenLine xmlns:a14="http://schemas.microsoft.com/office/drawing/2010/main" xmlns:p="http://schemas.openxmlformats.org/presentationml/2006/main" xmlns:r="http://schemas.openxmlformats.org/officeDocument/2006/relationships" xmlns:a="http://schemas.openxmlformats.org/drawingml/2006/main" xmlns="" w="9525">
                 <a:solidFill>
                   <a:schemeClr val="tx1"/>
                 </a:solidFill>
@@ -6232,7 +6304,7 @@
               </a14:hiddenLine>
             </a:ext>
             <a:ext uri="{AF507438-7753-43E0-B8FC-AC1667EBCBE1}">
-              <a14:hiddenEffects xmlns:a14="http://schemas.microsoft.com/office/drawing/2010/main">
+              <a14:hiddenEffects xmlns:a14="http://schemas.microsoft.com/office/drawing/2010/main" xmlns:p="http://schemas.openxmlformats.org/presentationml/2006/main" xmlns:r="http://schemas.openxmlformats.org/officeDocument/2006/relationships" xmlns:a="http://schemas.openxmlformats.org/drawingml/2006/main" xmlns="">
                 <a:effectLst>
                   <a:outerShdw dist="35921" dir="2700000" algn="ctr" rotWithShape="0">
                     <a:schemeClr val="bg2"/>
@@ -6284,7 +6356,7 @@
     </p:spTree>
     <p:extLst>
       <p:ext uri="{BB962C8B-B14F-4D97-AF65-F5344CB8AC3E}">
-        <p14:creationId xmlns:p14="http://schemas.microsoft.com/office/powerpoint/2010/main" val="1335597457"/>
+        <p14:creationId xmlns:p14="http://schemas.microsoft.com/office/powerpoint/2010/main" xmlns:p="http://schemas.openxmlformats.org/presentationml/2006/main" xmlns:r="http://schemas.openxmlformats.org/officeDocument/2006/relationships" xmlns:a="http://schemas.openxmlformats.org/drawingml/2006/main" xmlns="" val="1335597457"/>
       </p:ext>
     </p:extLst>
   </p:cSld>
@@ -6295,7 +6367,7 @@
 </file>
 
 <file path=ppt/slides/slide5.xml><?xml version="1.0" encoding="utf-8"?>
-<p:sld xmlns:a="http://schemas.openxmlformats.org/drawingml/2006/main" xmlns:r="http://schemas.openxmlformats.org/officeDocument/2006/relationships" xmlns:p="http://schemas.openxmlformats.org/presentationml/2006/main">
+<p:sld xmlns:a="http://schemas.openxmlformats.org/drawingml/2006/main" xmlns:r="http://schemas.openxmlformats.org/officeDocument/2006/relationships" xmlns:mc="http://schemas.openxmlformats.org/markup-compatibility/2006" xmlns:mv="urn:schemas-microsoft-com:mac:vml" xmlns:p="http://schemas.openxmlformats.org/presentationml/2006/main" mc:Ignorable="mv" mc:PreserveAttributes="mv:*">
   <p:cSld>
     <p:spTree>
       <p:nvGrpSpPr>
@@ -6410,7 +6482,7 @@
     </p:spTree>
     <p:extLst>
       <p:ext uri="{BB962C8B-B14F-4D97-AF65-F5344CB8AC3E}">
-        <p14:creationId xmlns:p14="http://schemas.microsoft.com/office/powerpoint/2010/main" val="552368841"/>
+        <p14:creationId xmlns:p14="http://schemas.microsoft.com/office/powerpoint/2010/main" xmlns:p="http://schemas.openxmlformats.org/presentationml/2006/main" xmlns:r="http://schemas.openxmlformats.org/officeDocument/2006/relationships" xmlns:a="http://schemas.openxmlformats.org/drawingml/2006/main" xmlns="" val="552368841"/>
       </p:ext>
     </p:extLst>
   </p:cSld>
@@ -6421,7 +6493,7 @@
 </file>
 
 <file path=ppt/slides/slide6.xml><?xml version="1.0" encoding="utf-8"?>
-<p:sld xmlns:a="http://schemas.openxmlformats.org/drawingml/2006/main" xmlns:r="http://schemas.openxmlformats.org/officeDocument/2006/relationships" xmlns:p="http://schemas.openxmlformats.org/presentationml/2006/main">
+<p:sld xmlns:a="http://schemas.openxmlformats.org/drawingml/2006/main" xmlns:r="http://schemas.openxmlformats.org/officeDocument/2006/relationships" xmlns:mc="http://schemas.openxmlformats.org/markup-compatibility/2006" xmlns:mv="urn:schemas-microsoft-com:mac:vml" xmlns:p="http://schemas.openxmlformats.org/presentationml/2006/main" mc:Ignorable="mv" mc:PreserveAttributes="mv:*">
   <p:cSld>
     <p:spTree>
       <p:nvGrpSpPr>
@@ -6533,7 +6605,7 @@
     </p:spTree>
     <p:extLst>
       <p:ext uri="{BB962C8B-B14F-4D97-AF65-F5344CB8AC3E}">
-        <p14:creationId xmlns:p14="http://schemas.microsoft.com/office/powerpoint/2010/main" val="3802318836"/>
+        <p14:creationId xmlns:p14="http://schemas.microsoft.com/office/powerpoint/2010/main" xmlns:p="http://schemas.openxmlformats.org/presentationml/2006/main" xmlns:r="http://schemas.openxmlformats.org/officeDocument/2006/relationships" xmlns:a="http://schemas.openxmlformats.org/drawingml/2006/main" xmlns="" val="3802318836"/>
       </p:ext>
     </p:extLst>
   </p:cSld>
@@ -6544,7 +6616,7 @@
 </file>
 
 <file path=ppt/slides/slide7.xml><?xml version="1.0" encoding="utf-8"?>
-<p:sld xmlns:a="http://schemas.openxmlformats.org/drawingml/2006/main" xmlns:r="http://schemas.openxmlformats.org/officeDocument/2006/relationships" xmlns:p="http://schemas.openxmlformats.org/presentationml/2006/main">
+<p:sld xmlns:a="http://schemas.openxmlformats.org/drawingml/2006/main" xmlns:r="http://schemas.openxmlformats.org/officeDocument/2006/relationships" xmlns:mc="http://schemas.openxmlformats.org/markup-compatibility/2006" xmlns:mv="urn:schemas-microsoft-com:mac:vml" xmlns:p="http://schemas.openxmlformats.org/presentationml/2006/main" mc:Ignorable="mv" mc:PreserveAttributes="mv:*">
   <p:cSld>
     <p:spTree>
       <p:nvGrpSpPr>
@@ -6578,7 +6650,7 @@
         </p:spPr>
         <p:txBody>
           <a:bodyPr>
-            <a:normAutofit lnSpcReduction="10000"/>
+            <a:normAutofit/>
           </a:bodyPr>
           <a:lstStyle/>
           <a:p>
@@ -6670,7 +6742,7 @@
     </p:spTree>
     <p:extLst>
       <p:ext uri="{BB962C8B-B14F-4D97-AF65-F5344CB8AC3E}">
-        <p14:creationId xmlns:p14="http://schemas.microsoft.com/office/powerpoint/2010/main" val="1418246983"/>
+        <p14:creationId xmlns:p14="http://schemas.microsoft.com/office/powerpoint/2010/main" xmlns:p="http://schemas.openxmlformats.org/presentationml/2006/main" xmlns:r="http://schemas.openxmlformats.org/officeDocument/2006/relationships" xmlns:a="http://schemas.openxmlformats.org/drawingml/2006/main" xmlns="" val="1418246983"/>
       </p:ext>
     </p:extLst>
   </p:cSld>

</xml_diff>